<commit_message>
Added About me and Agenda
</commit_message>
<xml_diff>
--- a/Programming Made Easy.pptx
+++ b/Programming Made Easy.pptx
@@ -7,6 +7,7 @@
   <p:sldIdLst>
     <p:sldId id="256" r:id="rId2"/>
     <p:sldId id="257" r:id="rId3"/>
+    <p:sldId id="258" r:id="rId4"/>
   </p:sldIdLst>
   <p:sldSz cx="9144000" cy="6858000" type="screen4x3"/>
   <p:notesSz cx="6858000" cy="9144000"/>
@@ -5016,7 +5017,7 @@
             <a:avLst/>
           </a:prstGeom>
           <a:solidFill>
-            <a:schemeClr val="tx2"/>
+            <a:schemeClr val="accent3"/>
           </a:solidFill>
         </p:spPr>
         <p:txBody>
@@ -5172,9 +5173,1335 @@
             </a:lvl9pPr>
           </a:lstStyle>
           <a:p>
+            <a:endParaRPr lang="en-CA" dirty="0"/>
+          </a:p>
+        </p:txBody>
+      </p:sp>
+      <p:pic>
+        <p:nvPicPr>
+          <p:cNvPr id="10" name="Picture 9"/>
+          <p:cNvPicPr>
+            <a:picLocks noChangeAspect="1"/>
+          </p:cNvPicPr>
+          <p:nvPr/>
+        </p:nvPicPr>
+        <p:blipFill>
+          <a:blip r:embed="rId2">
+            <a:extLst>
+              <a:ext uri="{28A0092B-C50C-407E-A947-70E740481C1C}">
+                <a14:useLocalDpi xmlns:a14="http://schemas.microsoft.com/office/drawing/2010/main" val="0"/>
+              </a:ext>
+            </a:extLst>
+          </a:blip>
+          <a:stretch>
+            <a:fillRect/>
+          </a:stretch>
+        </p:blipFill>
+        <p:spPr>
+          <a:xfrm>
+            <a:off x="611560" y="3476569"/>
+            <a:ext cx="2808312" cy="561662"/>
+          </a:xfrm>
+          <a:prstGeom prst="rect">
+            <a:avLst/>
+          </a:prstGeom>
+        </p:spPr>
+      </p:pic>
+      <p:sp>
+        <p:nvSpPr>
+          <p:cNvPr id="11" name="Content Placeholder 1"/>
+          <p:cNvSpPr txBox="1">
+            <a:spLocks/>
+          </p:cNvSpPr>
+          <p:nvPr/>
+        </p:nvSpPr>
+        <p:spPr>
+          <a:xfrm>
+            <a:off x="3724009" y="3149353"/>
+            <a:ext cx="3096344" cy="1368152"/>
+          </a:xfrm>
+          <a:prstGeom prst="rect">
+            <a:avLst/>
+          </a:prstGeom>
+          <a:solidFill>
+            <a:schemeClr val="bg1"/>
+          </a:solidFill>
+        </p:spPr>
+        <p:txBody>
+          <a:bodyPr/>
+          <a:lstStyle>
+            <a:lvl1pPr marL="0" indent="0" algn="l" defTabSz="914400" rtl="0" eaLnBrk="1" latinLnBrk="0" hangingPunct="1">
+              <a:spcBef>
+                <a:spcPct val="20000"/>
+              </a:spcBef>
+              <a:buClr>
+                <a:schemeClr val="tx1"/>
+              </a:buClr>
+              <a:buFontTx/>
+              <a:buNone/>
+              <a:defRPr sz="3200" kern="1200">
+                <a:solidFill>
+                  <a:schemeClr val="bg1"/>
+                </a:solidFill>
+                <a:latin typeface="Segoe UI Light" pitchFamily="34" charset="0"/>
+                <a:ea typeface="Segoe UI" pitchFamily="34" charset="0"/>
+                <a:cs typeface="Segoe UI" pitchFamily="34" charset="0"/>
+              </a:defRPr>
+            </a:lvl1pPr>
+            <a:lvl2pPr marL="254250" indent="0" algn="l" defTabSz="914400" rtl="0" eaLnBrk="1" latinLnBrk="0" hangingPunct="1">
+              <a:spcBef>
+                <a:spcPct val="20000"/>
+              </a:spcBef>
+              <a:buClr>
+                <a:schemeClr val="tx1"/>
+              </a:buClr>
+              <a:buFontTx/>
+              <a:buNone/>
+              <a:defRPr sz="2800" kern="1200">
+                <a:solidFill>
+                  <a:schemeClr val="bg1">
+                    <a:lumMod val="75000"/>
+                  </a:schemeClr>
+                </a:solidFill>
+                <a:latin typeface="Segoe UI Light" pitchFamily="34" charset="0"/>
+                <a:ea typeface="Segoe UI" pitchFamily="34" charset="0"/>
+                <a:cs typeface="Segoe UI" pitchFamily="34" charset="0"/>
+              </a:defRPr>
+            </a:lvl2pPr>
+            <a:lvl3pPr marL="491400" indent="0" algn="l" defTabSz="914400" rtl="0" eaLnBrk="1" latinLnBrk="0" hangingPunct="1">
+              <a:spcBef>
+                <a:spcPct val="20000"/>
+              </a:spcBef>
+              <a:buClr>
+                <a:schemeClr val="tx1"/>
+              </a:buClr>
+              <a:buFontTx/>
+              <a:buNone/>
+              <a:defRPr sz="2400" kern="1200">
+                <a:solidFill>
+                  <a:schemeClr val="bg1">
+                    <a:lumMod val="50000"/>
+                  </a:schemeClr>
+                </a:solidFill>
+                <a:latin typeface="Segoe UI Light" pitchFamily="34" charset="0"/>
+                <a:ea typeface="Segoe UI" pitchFamily="34" charset="0"/>
+                <a:cs typeface="Segoe UI" pitchFamily="34" charset="0"/>
+              </a:defRPr>
+            </a:lvl3pPr>
+            <a:lvl4pPr marL="1600200" indent="-228600" algn="l" defTabSz="914400" rtl="0" eaLnBrk="1" latinLnBrk="0" hangingPunct="1">
+              <a:spcBef>
+                <a:spcPct val="20000"/>
+              </a:spcBef>
+              <a:buFont typeface="Arial" pitchFamily="34" charset="0"/>
+              <a:buChar char="–"/>
+              <a:defRPr sz="2000" kern="1200">
+                <a:solidFill>
+                  <a:schemeClr val="bg1"/>
+                </a:solidFill>
+                <a:latin typeface="Segoe WP" pitchFamily="34" charset="0"/>
+                <a:ea typeface="Segoe UI" pitchFamily="34" charset="0"/>
+                <a:cs typeface="Segoe UI" pitchFamily="34" charset="0"/>
+              </a:defRPr>
+            </a:lvl4pPr>
+            <a:lvl5pPr marL="2057400" indent="-228600" algn="l" defTabSz="914400" rtl="0" eaLnBrk="1" latinLnBrk="0" hangingPunct="1">
+              <a:spcBef>
+                <a:spcPct val="20000"/>
+              </a:spcBef>
+              <a:buFont typeface="Arial" pitchFamily="34" charset="0"/>
+              <a:buChar char="»"/>
+              <a:defRPr sz="2000" kern="1200">
+                <a:solidFill>
+                  <a:schemeClr val="bg1"/>
+                </a:solidFill>
+                <a:latin typeface="Segoe WP" pitchFamily="34" charset="0"/>
+                <a:ea typeface="Segoe UI" pitchFamily="34" charset="0"/>
+                <a:cs typeface="Segoe UI" pitchFamily="34" charset="0"/>
+              </a:defRPr>
+            </a:lvl5pPr>
+            <a:lvl6pPr marL="2514600" indent="-228600" algn="l" defTabSz="914400" rtl="0" eaLnBrk="1" latinLnBrk="0" hangingPunct="1">
+              <a:spcBef>
+                <a:spcPct val="20000"/>
+              </a:spcBef>
+              <a:buFont typeface="Arial" pitchFamily="34" charset="0"/>
+              <a:buChar char="•"/>
+              <a:defRPr sz="2000" kern="1200">
+                <a:solidFill>
+                  <a:schemeClr val="tx1"/>
+                </a:solidFill>
+                <a:latin typeface="+mn-lt"/>
+                <a:ea typeface="+mn-ea"/>
+                <a:cs typeface="+mn-cs"/>
+              </a:defRPr>
+            </a:lvl6pPr>
+            <a:lvl7pPr marL="2971800" indent="-228600" algn="l" defTabSz="914400" rtl="0" eaLnBrk="1" latinLnBrk="0" hangingPunct="1">
+              <a:spcBef>
+                <a:spcPct val="20000"/>
+              </a:spcBef>
+              <a:buFont typeface="Arial" pitchFamily="34" charset="0"/>
+              <a:buChar char="•"/>
+              <a:defRPr sz="2000" kern="1200">
+                <a:solidFill>
+                  <a:schemeClr val="tx1"/>
+                </a:solidFill>
+                <a:latin typeface="+mn-lt"/>
+                <a:ea typeface="+mn-ea"/>
+                <a:cs typeface="+mn-cs"/>
+              </a:defRPr>
+            </a:lvl7pPr>
+            <a:lvl8pPr marL="3429000" indent="-228600" algn="l" defTabSz="914400" rtl="0" eaLnBrk="1" latinLnBrk="0" hangingPunct="1">
+              <a:spcBef>
+                <a:spcPct val="20000"/>
+              </a:spcBef>
+              <a:buFont typeface="Arial" pitchFamily="34" charset="0"/>
+              <a:buChar char="•"/>
+              <a:defRPr sz="2000" kern="1200">
+                <a:solidFill>
+                  <a:schemeClr val="tx1"/>
+                </a:solidFill>
+                <a:latin typeface="+mn-lt"/>
+                <a:ea typeface="+mn-ea"/>
+                <a:cs typeface="+mn-cs"/>
+              </a:defRPr>
+            </a:lvl8pPr>
+            <a:lvl9pPr marL="3886200" indent="-228600" algn="l" defTabSz="914400" rtl="0" eaLnBrk="1" latinLnBrk="0" hangingPunct="1">
+              <a:spcBef>
+                <a:spcPct val="20000"/>
+              </a:spcBef>
+              <a:buFont typeface="Arial" pitchFamily="34" charset="0"/>
+              <a:buChar char="•"/>
+              <a:defRPr sz="2000" kern="1200">
+                <a:solidFill>
+                  <a:schemeClr val="tx1"/>
+                </a:solidFill>
+                <a:latin typeface="+mn-lt"/>
+                <a:ea typeface="+mn-ea"/>
+                <a:cs typeface="+mn-cs"/>
+              </a:defRPr>
+            </a:lvl9pPr>
+          </a:lstStyle>
+          <a:p>
+            <a:endParaRPr lang="en-CA" dirty="0"/>
+          </a:p>
+        </p:txBody>
+      </p:sp>
+      <p:pic>
+        <p:nvPicPr>
+          <p:cNvPr id="1028" name="Picture 4" descr="C:\Users\bwasielak\Documents\WebMuses\Presentation\assets\MCP(rgb).png"/>
+          <p:cNvPicPr>
+            <a:picLocks noChangeAspect="1" noChangeArrowheads="1"/>
+          </p:cNvPicPr>
+          <p:nvPr/>
+        </p:nvPicPr>
+        <p:blipFill>
+          <a:blip r:embed="rId3">
+            <a:extLst>
+              <a:ext uri="{28A0092B-C50C-407E-A947-70E740481C1C}">
+                <a14:useLocalDpi xmlns:a14="http://schemas.microsoft.com/office/drawing/2010/main" val="0"/>
+              </a:ext>
+            </a:extLst>
+          </a:blip>
+          <a:srcRect/>
+          <a:stretch>
+            <a:fillRect/>
+          </a:stretch>
+        </p:blipFill>
+        <p:spPr bwMode="auto">
+          <a:xfrm>
+            <a:off x="4460342" y="3153963"/>
+            <a:ext cx="1524000" cy="762000"/>
+          </a:xfrm>
+          <a:prstGeom prst="rect">
+            <a:avLst/>
+          </a:prstGeom>
+          <a:noFill/>
+          <a:extLst>
+            <a:ext uri="{909E8E84-426E-40DD-AFC4-6F175D3DCCD1}">
+              <a14:hiddenFill xmlns:a14="http://schemas.microsoft.com/office/drawing/2010/main">
+                <a:solidFill>
+                  <a:srgbClr val="FFFFFF"/>
+                </a:solidFill>
+              </a14:hiddenFill>
+            </a:ext>
+          </a:extLst>
+        </p:spPr>
+      </p:pic>
+      <p:pic>
+        <p:nvPicPr>
+          <p:cNvPr id="1030" name="Picture 6" descr="C:\Users\bwasielak\Documents\WebMuses\Presentation\assets\MCTS(rgb)_1098_1103.png"/>
+          <p:cNvPicPr>
+            <a:picLocks noChangeAspect="1" noChangeArrowheads="1"/>
+          </p:cNvPicPr>
+          <p:nvPr/>
+        </p:nvPicPr>
+        <p:blipFill>
+          <a:blip r:embed="rId4">
+            <a:extLst>
+              <a:ext uri="{28A0092B-C50C-407E-A947-70E740481C1C}">
+                <a14:useLocalDpi xmlns:a14="http://schemas.microsoft.com/office/drawing/2010/main" val="0"/>
+              </a:ext>
+            </a:extLst>
+          </a:blip>
+          <a:srcRect/>
+          <a:stretch>
+            <a:fillRect/>
+          </a:stretch>
+        </p:blipFill>
+        <p:spPr bwMode="auto">
+          <a:xfrm>
+            <a:off x="3850120" y="3973089"/>
+            <a:ext cx="2844122" cy="456887"/>
+          </a:xfrm>
+          <a:prstGeom prst="rect">
+            <a:avLst/>
+          </a:prstGeom>
+          <a:noFill/>
+          <a:extLst>
+            <a:ext uri="{909E8E84-426E-40DD-AFC4-6F175D3DCCD1}">
+              <a14:hiddenFill xmlns:a14="http://schemas.microsoft.com/office/drawing/2010/main">
+                <a:solidFill>
+                  <a:srgbClr val="FFFFFF"/>
+                </a:solidFill>
+              </a14:hiddenFill>
+            </a:ext>
+          </a:extLst>
+        </p:spPr>
+      </p:pic>
+      <p:sp>
+        <p:nvSpPr>
+          <p:cNvPr id="18" name="Content Placeholder 1"/>
+          <p:cNvSpPr txBox="1">
+            <a:spLocks/>
+          </p:cNvSpPr>
+          <p:nvPr/>
+        </p:nvSpPr>
+        <p:spPr>
+          <a:xfrm>
+            <a:off x="467544" y="4626029"/>
+            <a:ext cx="3096344" cy="1368152"/>
+          </a:xfrm>
+          <a:prstGeom prst="rect">
+            <a:avLst/>
+          </a:prstGeom>
+          <a:solidFill>
+            <a:srgbClr val="070D55"/>
+          </a:solidFill>
+        </p:spPr>
+        <p:txBody>
+          <a:bodyPr/>
+          <a:lstStyle>
+            <a:lvl1pPr marL="0" indent="0" algn="l" defTabSz="914400" rtl="0" eaLnBrk="1" latinLnBrk="0" hangingPunct="1">
+              <a:spcBef>
+                <a:spcPct val="20000"/>
+              </a:spcBef>
+              <a:buClr>
+                <a:schemeClr val="tx1"/>
+              </a:buClr>
+              <a:buFontTx/>
+              <a:buNone/>
+              <a:defRPr sz="3200" kern="1200">
+                <a:solidFill>
+                  <a:schemeClr val="bg1"/>
+                </a:solidFill>
+                <a:latin typeface="Segoe UI Light" pitchFamily="34" charset="0"/>
+                <a:ea typeface="Segoe UI" pitchFamily="34" charset="0"/>
+                <a:cs typeface="Segoe UI" pitchFamily="34" charset="0"/>
+              </a:defRPr>
+            </a:lvl1pPr>
+            <a:lvl2pPr marL="254250" indent="0" algn="l" defTabSz="914400" rtl="0" eaLnBrk="1" latinLnBrk="0" hangingPunct="1">
+              <a:spcBef>
+                <a:spcPct val="20000"/>
+              </a:spcBef>
+              <a:buClr>
+                <a:schemeClr val="tx1"/>
+              </a:buClr>
+              <a:buFontTx/>
+              <a:buNone/>
+              <a:defRPr sz="2800" kern="1200">
+                <a:solidFill>
+                  <a:schemeClr val="bg1">
+                    <a:lumMod val="75000"/>
+                  </a:schemeClr>
+                </a:solidFill>
+                <a:latin typeface="Segoe UI Light" pitchFamily="34" charset="0"/>
+                <a:ea typeface="Segoe UI" pitchFamily="34" charset="0"/>
+                <a:cs typeface="Segoe UI" pitchFamily="34" charset="0"/>
+              </a:defRPr>
+            </a:lvl2pPr>
+            <a:lvl3pPr marL="491400" indent="0" algn="l" defTabSz="914400" rtl="0" eaLnBrk="1" latinLnBrk="0" hangingPunct="1">
+              <a:spcBef>
+                <a:spcPct val="20000"/>
+              </a:spcBef>
+              <a:buClr>
+                <a:schemeClr val="tx1"/>
+              </a:buClr>
+              <a:buFontTx/>
+              <a:buNone/>
+              <a:defRPr sz="2400" kern="1200">
+                <a:solidFill>
+                  <a:schemeClr val="bg1">
+                    <a:lumMod val="50000"/>
+                  </a:schemeClr>
+                </a:solidFill>
+                <a:latin typeface="Segoe UI Light" pitchFamily="34" charset="0"/>
+                <a:ea typeface="Segoe UI" pitchFamily="34" charset="0"/>
+                <a:cs typeface="Segoe UI" pitchFamily="34" charset="0"/>
+              </a:defRPr>
+            </a:lvl3pPr>
+            <a:lvl4pPr marL="1600200" indent="-228600" algn="l" defTabSz="914400" rtl="0" eaLnBrk="1" latinLnBrk="0" hangingPunct="1">
+              <a:spcBef>
+                <a:spcPct val="20000"/>
+              </a:spcBef>
+              <a:buFont typeface="Arial" pitchFamily="34" charset="0"/>
+              <a:buChar char="–"/>
+              <a:defRPr sz="2000" kern="1200">
+                <a:solidFill>
+                  <a:schemeClr val="bg1"/>
+                </a:solidFill>
+                <a:latin typeface="Segoe WP" pitchFamily="34" charset="0"/>
+                <a:ea typeface="Segoe UI" pitchFamily="34" charset="0"/>
+                <a:cs typeface="Segoe UI" pitchFamily="34" charset="0"/>
+              </a:defRPr>
+            </a:lvl4pPr>
+            <a:lvl5pPr marL="2057400" indent="-228600" algn="l" defTabSz="914400" rtl="0" eaLnBrk="1" latinLnBrk="0" hangingPunct="1">
+              <a:spcBef>
+                <a:spcPct val="20000"/>
+              </a:spcBef>
+              <a:buFont typeface="Arial" pitchFamily="34" charset="0"/>
+              <a:buChar char="»"/>
+              <a:defRPr sz="2000" kern="1200">
+                <a:solidFill>
+                  <a:schemeClr val="bg1"/>
+                </a:solidFill>
+                <a:latin typeface="Segoe WP" pitchFamily="34" charset="0"/>
+                <a:ea typeface="Segoe UI" pitchFamily="34" charset="0"/>
+                <a:cs typeface="Segoe UI" pitchFamily="34" charset="0"/>
+              </a:defRPr>
+            </a:lvl5pPr>
+            <a:lvl6pPr marL="2514600" indent="-228600" algn="l" defTabSz="914400" rtl="0" eaLnBrk="1" latinLnBrk="0" hangingPunct="1">
+              <a:spcBef>
+                <a:spcPct val="20000"/>
+              </a:spcBef>
+              <a:buFont typeface="Arial" pitchFamily="34" charset="0"/>
+              <a:buChar char="•"/>
+              <a:defRPr sz="2000" kern="1200">
+                <a:solidFill>
+                  <a:schemeClr val="tx1"/>
+                </a:solidFill>
+                <a:latin typeface="+mn-lt"/>
+                <a:ea typeface="+mn-ea"/>
+                <a:cs typeface="+mn-cs"/>
+              </a:defRPr>
+            </a:lvl6pPr>
+            <a:lvl7pPr marL="2971800" indent="-228600" algn="l" defTabSz="914400" rtl="0" eaLnBrk="1" latinLnBrk="0" hangingPunct="1">
+              <a:spcBef>
+                <a:spcPct val="20000"/>
+              </a:spcBef>
+              <a:buFont typeface="Arial" pitchFamily="34" charset="0"/>
+              <a:buChar char="•"/>
+              <a:defRPr sz="2000" kern="1200">
+                <a:solidFill>
+                  <a:schemeClr val="tx1"/>
+                </a:solidFill>
+                <a:latin typeface="+mn-lt"/>
+                <a:ea typeface="+mn-ea"/>
+                <a:cs typeface="+mn-cs"/>
+              </a:defRPr>
+            </a:lvl7pPr>
+            <a:lvl8pPr marL="3429000" indent="-228600" algn="l" defTabSz="914400" rtl="0" eaLnBrk="1" latinLnBrk="0" hangingPunct="1">
+              <a:spcBef>
+                <a:spcPct val="20000"/>
+              </a:spcBef>
+              <a:buFont typeface="Arial" pitchFamily="34" charset="0"/>
+              <a:buChar char="•"/>
+              <a:defRPr sz="2000" kern="1200">
+                <a:solidFill>
+                  <a:schemeClr val="tx1"/>
+                </a:solidFill>
+                <a:latin typeface="+mn-lt"/>
+                <a:ea typeface="+mn-ea"/>
+                <a:cs typeface="+mn-cs"/>
+              </a:defRPr>
+            </a:lvl8pPr>
+            <a:lvl9pPr marL="3886200" indent="-228600" algn="l" defTabSz="914400" rtl="0" eaLnBrk="1" latinLnBrk="0" hangingPunct="1">
+              <a:spcBef>
+                <a:spcPct val="20000"/>
+              </a:spcBef>
+              <a:buFont typeface="Arial" pitchFamily="34" charset="0"/>
+              <a:buChar char="•"/>
+              <a:defRPr sz="2000" kern="1200">
+                <a:solidFill>
+                  <a:schemeClr val="tx1"/>
+                </a:solidFill>
+                <a:latin typeface="+mn-lt"/>
+                <a:ea typeface="+mn-ea"/>
+                <a:cs typeface="+mn-cs"/>
+              </a:defRPr>
+            </a:lvl9pPr>
+          </a:lstStyle>
+          <a:p>
+            <a:endParaRPr lang="en-CA" dirty="0"/>
+          </a:p>
+        </p:txBody>
+      </p:sp>
+      <p:pic>
+        <p:nvPicPr>
+          <p:cNvPr id="1031" name="Picture 7" descr="C:\Users\bwasielak\Documents\Pod Jednym Dachem\zdjęcia\logoPJD.png"/>
+          <p:cNvPicPr>
+            <a:picLocks noChangeAspect="1" noChangeArrowheads="1"/>
+          </p:cNvPicPr>
+          <p:nvPr/>
+        </p:nvPicPr>
+        <p:blipFill>
+          <a:blip r:embed="rId5">
+            <a:extLst>
+              <a:ext uri="{28A0092B-C50C-407E-A947-70E740481C1C}">
+                <a14:useLocalDpi xmlns:a14="http://schemas.microsoft.com/office/drawing/2010/main" val="0"/>
+              </a:ext>
+            </a:extLst>
+          </a:blip>
+          <a:srcRect/>
+          <a:stretch>
+            <a:fillRect/>
+          </a:stretch>
+        </p:blipFill>
+        <p:spPr bwMode="auto">
+          <a:xfrm>
+            <a:off x="467544" y="4624373"/>
+            <a:ext cx="1944216" cy="1370257"/>
+          </a:xfrm>
+          <a:prstGeom prst="rect">
+            <a:avLst/>
+          </a:prstGeom>
+          <a:noFill/>
+          <a:extLst>
+            <a:ext uri="{909E8E84-426E-40DD-AFC4-6F175D3DCCD1}">
+              <a14:hiddenFill xmlns:a14="http://schemas.microsoft.com/office/drawing/2010/main">
+                <a:solidFill>
+                  <a:srgbClr val="FFFFFF"/>
+                </a:solidFill>
+              </a14:hiddenFill>
+            </a:ext>
+          </a:extLst>
+        </p:spPr>
+      </p:pic>
+    </p:spTree>
+    <p:extLst>
+      <p:ext uri="{BB962C8B-B14F-4D97-AF65-F5344CB8AC3E}">
+        <p14:creationId xmlns:p14="http://schemas.microsoft.com/office/powerpoint/2010/main" val="2932275863"/>
+      </p:ext>
+    </p:extLst>
+  </p:cSld>
+  <p:clrMapOvr>
+    <a:masterClrMapping/>
+  </p:clrMapOvr>
+  <mc:AlternateContent xmlns:mc="http://schemas.openxmlformats.org/markup-compatibility/2006" xmlns:p14="http://schemas.microsoft.com/office/powerpoint/2010/main">
+    <mc:Choice Requires="p14">
+      <p:transition spd="slow" p14:dur="2000"/>
+    </mc:Choice>
+    <mc:Fallback xmlns="">
+      <p:transition spd="slow"/>
+    </mc:Fallback>
+  </mc:AlternateContent>
+  <p:timing>
+    <p:tnLst>
+      <p:par>
+        <p:cTn id="1" dur="indefinite" restart="never" nodeType="tmRoot"/>
+      </p:par>
+    </p:tnLst>
+  </p:timing>
+</p:sld>
+</file>
+
+<file path=ppt/slides/slide3.xml><?xml version="1.0" encoding="utf-8"?>
+<p:sld xmlns:a="http://schemas.openxmlformats.org/drawingml/2006/main" xmlns:r="http://schemas.openxmlformats.org/officeDocument/2006/relationships" xmlns:p="http://schemas.openxmlformats.org/presentationml/2006/main">
+  <p:cSld>
+    <p:spTree>
+      <p:nvGrpSpPr>
+        <p:cNvPr id="1" name=""/>
+        <p:cNvGrpSpPr/>
+        <p:nvPr/>
+      </p:nvGrpSpPr>
+      <p:grpSpPr>
+        <a:xfrm>
+          <a:off x="0" y="0"/>
+          <a:ext cx="0" cy="0"/>
+          <a:chOff x="0" y="0"/>
+          <a:chExt cx="0" cy="0"/>
+        </a:xfrm>
+      </p:grpSpPr>
+      <p:sp>
+        <p:nvSpPr>
+          <p:cNvPr id="3" name="Title 2"/>
+          <p:cNvSpPr>
+            <a:spLocks noGrp="1"/>
+          </p:cNvSpPr>
+          <p:nvPr>
+            <p:ph type="title"/>
+          </p:nvPr>
+        </p:nvSpPr>
+        <p:spPr/>
+        <p:txBody>
+          <a:bodyPr/>
+          <a:lstStyle/>
+          <a:p>
             <a:r>
-              <a:rPr lang="pl-PL" smtClean="0"/>
-              <a:t>Bartek Wasielak</a:t>
+              <a:rPr lang="pl-PL" dirty="0" smtClean="0"/>
+              <a:t>Agenda</a:t>
+            </a:r>
+            <a:endParaRPr lang="en-CA" dirty="0"/>
+          </a:p>
+        </p:txBody>
+      </p:sp>
+      <p:sp>
+        <p:nvSpPr>
+          <p:cNvPr id="4" name="Content Placeholder 1"/>
+          <p:cNvSpPr>
+            <a:spLocks noGrp="1"/>
+          </p:cNvSpPr>
+          <p:nvPr>
+            <p:ph idx="1"/>
+          </p:nvPr>
+        </p:nvSpPr>
+        <p:spPr>
+          <a:xfrm>
+            <a:off x="467544" y="1628801"/>
+            <a:ext cx="3096344" cy="1368152"/>
+          </a:xfrm>
+          <a:solidFill>
+            <a:schemeClr val="tx2"/>
+          </a:solidFill>
+        </p:spPr>
+        <p:txBody>
+          <a:bodyPr/>
+          <a:lstStyle/>
+          <a:p>
+            <a:r>
+              <a:rPr lang="pl-PL" dirty="0" smtClean="0"/>
+              <a:t>Why do we program?</a:t>
+            </a:r>
+            <a:endParaRPr lang="en-CA" dirty="0"/>
+          </a:p>
+        </p:txBody>
+      </p:sp>
+      <p:sp>
+        <p:nvSpPr>
+          <p:cNvPr id="5" name="Content Placeholder 1"/>
+          <p:cNvSpPr txBox="1">
+            <a:spLocks/>
+          </p:cNvSpPr>
+          <p:nvPr/>
+        </p:nvSpPr>
+        <p:spPr>
+          <a:xfrm>
+            <a:off x="3716288" y="1628800"/>
+            <a:ext cx="3096344" cy="1368152"/>
+          </a:xfrm>
+          <a:prstGeom prst="rect">
+            <a:avLst/>
+          </a:prstGeom>
+          <a:solidFill>
+            <a:schemeClr val="accent2"/>
+          </a:solidFill>
+        </p:spPr>
+        <p:txBody>
+          <a:bodyPr/>
+          <a:lstStyle>
+            <a:lvl1pPr marL="0" indent="0" algn="l" defTabSz="914400" rtl="0" eaLnBrk="1" latinLnBrk="0" hangingPunct="1">
+              <a:spcBef>
+                <a:spcPct val="20000"/>
+              </a:spcBef>
+              <a:buClr>
+                <a:schemeClr val="tx1"/>
+              </a:buClr>
+              <a:buFontTx/>
+              <a:buNone/>
+              <a:defRPr sz="3200" kern="1200">
+                <a:solidFill>
+                  <a:schemeClr val="bg1"/>
+                </a:solidFill>
+                <a:latin typeface="Segoe UI Light" pitchFamily="34" charset="0"/>
+                <a:ea typeface="Segoe UI" pitchFamily="34" charset="0"/>
+                <a:cs typeface="Segoe UI" pitchFamily="34" charset="0"/>
+              </a:defRPr>
+            </a:lvl1pPr>
+            <a:lvl2pPr marL="254250" indent="0" algn="l" defTabSz="914400" rtl="0" eaLnBrk="1" latinLnBrk="0" hangingPunct="1">
+              <a:spcBef>
+                <a:spcPct val="20000"/>
+              </a:spcBef>
+              <a:buClr>
+                <a:schemeClr val="tx1"/>
+              </a:buClr>
+              <a:buFontTx/>
+              <a:buNone/>
+              <a:defRPr sz="2800" kern="1200">
+                <a:solidFill>
+                  <a:schemeClr val="bg1">
+                    <a:lumMod val="75000"/>
+                  </a:schemeClr>
+                </a:solidFill>
+                <a:latin typeface="Segoe UI Light" pitchFamily="34" charset="0"/>
+                <a:ea typeface="Segoe UI" pitchFamily="34" charset="0"/>
+                <a:cs typeface="Segoe UI" pitchFamily="34" charset="0"/>
+              </a:defRPr>
+            </a:lvl2pPr>
+            <a:lvl3pPr marL="491400" indent="0" algn="l" defTabSz="914400" rtl="0" eaLnBrk="1" latinLnBrk="0" hangingPunct="1">
+              <a:spcBef>
+                <a:spcPct val="20000"/>
+              </a:spcBef>
+              <a:buClr>
+                <a:schemeClr val="tx1"/>
+              </a:buClr>
+              <a:buFontTx/>
+              <a:buNone/>
+              <a:defRPr sz="2400" kern="1200">
+                <a:solidFill>
+                  <a:schemeClr val="bg1">
+                    <a:lumMod val="50000"/>
+                  </a:schemeClr>
+                </a:solidFill>
+                <a:latin typeface="Segoe UI Light" pitchFamily="34" charset="0"/>
+                <a:ea typeface="Segoe UI" pitchFamily="34" charset="0"/>
+                <a:cs typeface="Segoe UI" pitchFamily="34" charset="0"/>
+              </a:defRPr>
+            </a:lvl3pPr>
+            <a:lvl4pPr marL="1600200" indent="-228600" algn="l" defTabSz="914400" rtl="0" eaLnBrk="1" latinLnBrk="0" hangingPunct="1">
+              <a:spcBef>
+                <a:spcPct val="20000"/>
+              </a:spcBef>
+              <a:buFont typeface="Arial" pitchFamily="34" charset="0"/>
+              <a:buChar char="–"/>
+              <a:defRPr sz="2000" kern="1200">
+                <a:solidFill>
+                  <a:schemeClr val="bg1"/>
+                </a:solidFill>
+                <a:latin typeface="Segoe WP" pitchFamily="34" charset="0"/>
+                <a:ea typeface="Segoe UI" pitchFamily="34" charset="0"/>
+                <a:cs typeface="Segoe UI" pitchFamily="34" charset="0"/>
+              </a:defRPr>
+            </a:lvl4pPr>
+            <a:lvl5pPr marL="2057400" indent="-228600" algn="l" defTabSz="914400" rtl="0" eaLnBrk="1" latinLnBrk="0" hangingPunct="1">
+              <a:spcBef>
+                <a:spcPct val="20000"/>
+              </a:spcBef>
+              <a:buFont typeface="Arial" pitchFamily="34" charset="0"/>
+              <a:buChar char="»"/>
+              <a:defRPr sz="2000" kern="1200">
+                <a:solidFill>
+                  <a:schemeClr val="bg1"/>
+                </a:solidFill>
+                <a:latin typeface="Segoe WP" pitchFamily="34" charset="0"/>
+                <a:ea typeface="Segoe UI" pitchFamily="34" charset="0"/>
+                <a:cs typeface="Segoe UI" pitchFamily="34" charset="0"/>
+              </a:defRPr>
+            </a:lvl5pPr>
+            <a:lvl6pPr marL="2514600" indent="-228600" algn="l" defTabSz="914400" rtl="0" eaLnBrk="1" latinLnBrk="0" hangingPunct="1">
+              <a:spcBef>
+                <a:spcPct val="20000"/>
+              </a:spcBef>
+              <a:buFont typeface="Arial" pitchFamily="34" charset="0"/>
+              <a:buChar char="•"/>
+              <a:defRPr sz="2000" kern="1200">
+                <a:solidFill>
+                  <a:schemeClr val="tx1"/>
+                </a:solidFill>
+                <a:latin typeface="+mn-lt"/>
+                <a:ea typeface="+mn-ea"/>
+                <a:cs typeface="+mn-cs"/>
+              </a:defRPr>
+            </a:lvl6pPr>
+            <a:lvl7pPr marL="2971800" indent="-228600" algn="l" defTabSz="914400" rtl="0" eaLnBrk="1" latinLnBrk="0" hangingPunct="1">
+              <a:spcBef>
+                <a:spcPct val="20000"/>
+              </a:spcBef>
+              <a:buFont typeface="Arial" pitchFamily="34" charset="0"/>
+              <a:buChar char="•"/>
+              <a:defRPr sz="2000" kern="1200">
+                <a:solidFill>
+                  <a:schemeClr val="tx1"/>
+                </a:solidFill>
+                <a:latin typeface="+mn-lt"/>
+                <a:ea typeface="+mn-ea"/>
+                <a:cs typeface="+mn-cs"/>
+              </a:defRPr>
+            </a:lvl7pPr>
+            <a:lvl8pPr marL="3429000" indent="-228600" algn="l" defTabSz="914400" rtl="0" eaLnBrk="1" latinLnBrk="0" hangingPunct="1">
+              <a:spcBef>
+                <a:spcPct val="20000"/>
+              </a:spcBef>
+              <a:buFont typeface="Arial" pitchFamily="34" charset="0"/>
+              <a:buChar char="•"/>
+              <a:defRPr sz="2000" kern="1200">
+                <a:solidFill>
+                  <a:schemeClr val="tx1"/>
+                </a:solidFill>
+                <a:latin typeface="+mn-lt"/>
+                <a:ea typeface="+mn-ea"/>
+                <a:cs typeface="+mn-cs"/>
+              </a:defRPr>
+            </a:lvl8pPr>
+            <a:lvl9pPr marL="3886200" indent="-228600" algn="l" defTabSz="914400" rtl="0" eaLnBrk="1" latinLnBrk="0" hangingPunct="1">
+              <a:spcBef>
+                <a:spcPct val="20000"/>
+              </a:spcBef>
+              <a:buFont typeface="Arial" pitchFamily="34" charset="0"/>
+              <a:buChar char="•"/>
+              <a:defRPr sz="2000" kern="1200">
+                <a:solidFill>
+                  <a:schemeClr val="tx1"/>
+                </a:solidFill>
+                <a:latin typeface="+mn-lt"/>
+                <a:ea typeface="+mn-ea"/>
+                <a:cs typeface="+mn-cs"/>
+              </a:defRPr>
+            </a:lvl9pPr>
+          </a:lstStyle>
+          <a:p>
+            <a:r>
+              <a:rPr lang="pl-PL" dirty="0" smtClean="0"/>
+              <a:t>Different languages</a:t>
+            </a:r>
+            <a:endParaRPr lang="en-CA" dirty="0"/>
+          </a:p>
+        </p:txBody>
+      </p:sp>
+      <p:sp>
+        <p:nvSpPr>
+          <p:cNvPr id="6" name="Content Placeholder 1"/>
+          <p:cNvSpPr txBox="1">
+            <a:spLocks/>
+          </p:cNvSpPr>
+          <p:nvPr/>
+        </p:nvSpPr>
+        <p:spPr>
+          <a:xfrm>
+            <a:off x="3716288" y="3139010"/>
+            <a:ext cx="3096344" cy="1368152"/>
+          </a:xfrm>
+          <a:prstGeom prst="rect">
+            <a:avLst/>
+          </a:prstGeom>
+          <a:solidFill>
+            <a:schemeClr val="accent1"/>
+          </a:solidFill>
+        </p:spPr>
+        <p:txBody>
+          <a:bodyPr/>
+          <a:lstStyle>
+            <a:lvl1pPr marL="0" indent="0" algn="l" defTabSz="914400" rtl="0" eaLnBrk="1" latinLnBrk="0" hangingPunct="1">
+              <a:spcBef>
+                <a:spcPct val="20000"/>
+              </a:spcBef>
+              <a:buClr>
+                <a:schemeClr val="tx1"/>
+              </a:buClr>
+              <a:buFontTx/>
+              <a:buNone/>
+              <a:defRPr sz="3200" kern="1200">
+                <a:solidFill>
+                  <a:schemeClr val="bg1"/>
+                </a:solidFill>
+                <a:latin typeface="Segoe UI Light" pitchFamily="34" charset="0"/>
+                <a:ea typeface="Segoe UI" pitchFamily="34" charset="0"/>
+                <a:cs typeface="Segoe UI" pitchFamily="34" charset="0"/>
+              </a:defRPr>
+            </a:lvl1pPr>
+            <a:lvl2pPr marL="254250" indent="0" algn="l" defTabSz="914400" rtl="0" eaLnBrk="1" latinLnBrk="0" hangingPunct="1">
+              <a:spcBef>
+                <a:spcPct val="20000"/>
+              </a:spcBef>
+              <a:buClr>
+                <a:schemeClr val="tx1"/>
+              </a:buClr>
+              <a:buFontTx/>
+              <a:buNone/>
+              <a:defRPr sz="2800" kern="1200">
+                <a:solidFill>
+                  <a:schemeClr val="bg1">
+                    <a:lumMod val="75000"/>
+                  </a:schemeClr>
+                </a:solidFill>
+                <a:latin typeface="Segoe UI Light" pitchFamily="34" charset="0"/>
+                <a:ea typeface="Segoe UI" pitchFamily="34" charset="0"/>
+                <a:cs typeface="Segoe UI" pitchFamily="34" charset="0"/>
+              </a:defRPr>
+            </a:lvl2pPr>
+            <a:lvl3pPr marL="491400" indent="0" algn="l" defTabSz="914400" rtl="0" eaLnBrk="1" latinLnBrk="0" hangingPunct="1">
+              <a:spcBef>
+                <a:spcPct val="20000"/>
+              </a:spcBef>
+              <a:buClr>
+                <a:schemeClr val="tx1"/>
+              </a:buClr>
+              <a:buFontTx/>
+              <a:buNone/>
+              <a:defRPr sz="2400" kern="1200">
+                <a:solidFill>
+                  <a:schemeClr val="bg1">
+                    <a:lumMod val="50000"/>
+                  </a:schemeClr>
+                </a:solidFill>
+                <a:latin typeface="Segoe UI Light" pitchFamily="34" charset="0"/>
+                <a:ea typeface="Segoe UI" pitchFamily="34" charset="0"/>
+                <a:cs typeface="Segoe UI" pitchFamily="34" charset="0"/>
+              </a:defRPr>
+            </a:lvl3pPr>
+            <a:lvl4pPr marL="1600200" indent="-228600" algn="l" defTabSz="914400" rtl="0" eaLnBrk="1" latinLnBrk="0" hangingPunct="1">
+              <a:spcBef>
+                <a:spcPct val="20000"/>
+              </a:spcBef>
+              <a:buFont typeface="Arial" pitchFamily="34" charset="0"/>
+              <a:buChar char="–"/>
+              <a:defRPr sz="2000" kern="1200">
+                <a:solidFill>
+                  <a:schemeClr val="bg1"/>
+                </a:solidFill>
+                <a:latin typeface="Segoe WP" pitchFamily="34" charset="0"/>
+                <a:ea typeface="Segoe UI" pitchFamily="34" charset="0"/>
+                <a:cs typeface="Segoe UI" pitchFamily="34" charset="0"/>
+              </a:defRPr>
+            </a:lvl4pPr>
+            <a:lvl5pPr marL="2057400" indent="-228600" algn="l" defTabSz="914400" rtl="0" eaLnBrk="1" latinLnBrk="0" hangingPunct="1">
+              <a:spcBef>
+                <a:spcPct val="20000"/>
+              </a:spcBef>
+              <a:buFont typeface="Arial" pitchFamily="34" charset="0"/>
+              <a:buChar char="»"/>
+              <a:defRPr sz="2000" kern="1200">
+                <a:solidFill>
+                  <a:schemeClr val="bg1"/>
+                </a:solidFill>
+                <a:latin typeface="Segoe WP" pitchFamily="34" charset="0"/>
+                <a:ea typeface="Segoe UI" pitchFamily="34" charset="0"/>
+                <a:cs typeface="Segoe UI" pitchFamily="34" charset="0"/>
+              </a:defRPr>
+            </a:lvl5pPr>
+            <a:lvl6pPr marL="2514600" indent="-228600" algn="l" defTabSz="914400" rtl="0" eaLnBrk="1" latinLnBrk="0" hangingPunct="1">
+              <a:spcBef>
+                <a:spcPct val="20000"/>
+              </a:spcBef>
+              <a:buFont typeface="Arial" pitchFamily="34" charset="0"/>
+              <a:buChar char="•"/>
+              <a:defRPr sz="2000" kern="1200">
+                <a:solidFill>
+                  <a:schemeClr val="tx1"/>
+                </a:solidFill>
+                <a:latin typeface="+mn-lt"/>
+                <a:ea typeface="+mn-ea"/>
+                <a:cs typeface="+mn-cs"/>
+              </a:defRPr>
+            </a:lvl6pPr>
+            <a:lvl7pPr marL="2971800" indent="-228600" algn="l" defTabSz="914400" rtl="0" eaLnBrk="1" latinLnBrk="0" hangingPunct="1">
+              <a:spcBef>
+                <a:spcPct val="20000"/>
+              </a:spcBef>
+              <a:buFont typeface="Arial" pitchFamily="34" charset="0"/>
+              <a:buChar char="•"/>
+              <a:defRPr sz="2000" kern="1200">
+                <a:solidFill>
+                  <a:schemeClr val="tx1"/>
+                </a:solidFill>
+                <a:latin typeface="+mn-lt"/>
+                <a:ea typeface="+mn-ea"/>
+                <a:cs typeface="+mn-cs"/>
+              </a:defRPr>
+            </a:lvl7pPr>
+            <a:lvl8pPr marL="3429000" indent="-228600" algn="l" defTabSz="914400" rtl="0" eaLnBrk="1" latinLnBrk="0" hangingPunct="1">
+              <a:spcBef>
+                <a:spcPct val="20000"/>
+              </a:spcBef>
+              <a:buFont typeface="Arial" pitchFamily="34" charset="0"/>
+              <a:buChar char="•"/>
+              <a:defRPr sz="2000" kern="1200">
+                <a:solidFill>
+                  <a:schemeClr val="tx1"/>
+                </a:solidFill>
+                <a:latin typeface="+mn-lt"/>
+                <a:ea typeface="+mn-ea"/>
+                <a:cs typeface="+mn-cs"/>
+              </a:defRPr>
+            </a:lvl8pPr>
+            <a:lvl9pPr marL="3886200" indent="-228600" algn="l" defTabSz="914400" rtl="0" eaLnBrk="1" latinLnBrk="0" hangingPunct="1">
+              <a:spcBef>
+                <a:spcPct val="20000"/>
+              </a:spcBef>
+              <a:buFont typeface="Arial" pitchFamily="34" charset="0"/>
+              <a:buChar char="•"/>
+              <a:defRPr sz="2000" kern="1200">
+                <a:solidFill>
+                  <a:schemeClr val="tx1"/>
+                </a:solidFill>
+                <a:latin typeface="+mn-lt"/>
+                <a:ea typeface="+mn-ea"/>
+                <a:cs typeface="+mn-cs"/>
+              </a:defRPr>
+            </a:lvl9pPr>
+          </a:lstStyle>
+          <a:p>
+            <a:r>
+              <a:rPr lang="pl-PL" dirty="0" smtClean="0"/>
+              <a:t>Introduction to OOP</a:t>
+            </a:r>
+            <a:endParaRPr lang="en-CA" dirty="0"/>
+          </a:p>
+        </p:txBody>
+      </p:sp>
+      <p:sp>
+        <p:nvSpPr>
+          <p:cNvPr id="7" name="Content Placeholder 1"/>
+          <p:cNvSpPr txBox="1">
+            <a:spLocks/>
+          </p:cNvSpPr>
+          <p:nvPr/>
+        </p:nvSpPr>
+        <p:spPr>
+          <a:xfrm>
+            <a:off x="467544" y="4653136"/>
+            <a:ext cx="3096344" cy="1368152"/>
+          </a:xfrm>
+          <a:prstGeom prst="rect">
+            <a:avLst/>
+          </a:prstGeom>
+          <a:solidFill>
+            <a:schemeClr val="accent4"/>
+          </a:solidFill>
+        </p:spPr>
+        <p:txBody>
+          <a:bodyPr/>
+          <a:lstStyle>
+            <a:lvl1pPr marL="0" indent="0" algn="l" defTabSz="914400" rtl="0" eaLnBrk="1" latinLnBrk="0" hangingPunct="1">
+              <a:spcBef>
+                <a:spcPct val="20000"/>
+              </a:spcBef>
+              <a:buClr>
+                <a:schemeClr val="tx1"/>
+              </a:buClr>
+              <a:buFontTx/>
+              <a:buNone/>
+              <a:defRPr sz="3200" kern="1200">
+                <a:solidFill>
+                  <a:schemeClr val="bg1"/>
+                </a:solidFill>
+                <a:latin typeface="Segoe UI Light" pitchFamily="34" charset="0"/>
+                <a:ea typeface="Segoe UI" pitchFamily="34" charset="0"/>
+                <a:cs typeface="Segoe UI" pitchFamily="34" charset="0"/>
+              </a:defRPr>
+            </a:lvl1pPr>
+            <a:lvl2pPr marL="254250" indent="0" algn="l" defTabSz="914400" rtl="0" eaLnBrk="1" latinLnBrk="0" hangingPunct="1">
+              <a:spcBef>
+                <a:spcPct val="20000"/>
+              </a:spcBef>
+              <a:buClr>
+                <a:schemeClr val="tx1"/>
+              </a:buClr>
+              <a:buFontTx/>
+              <a:buNone/>
+              <a:defRPr sz="2800" kern="1200">
+                <a:solidFill>
+                  <a:schemeClr val="bg1">
+                    <a:lumMod val="75000"/>
+                  </a:schemeClr>
+                </a:solidFill>
+                <a:latin typeface="Segoe UI Light" pitchFamily="34" charset="0"/>
+                <a:ea typeface="Segoe UI" pitchFamily="34" charset="0"/>
+                <a:cs typeface="Segoe UI" pitchFamily="34" charset="0"/>
+              </a:defRPr>
+            </a:lvl2pPr>
+            <a:lvl3pPr marL="491400" indent="0" algn="l" defTabSz="914400" rtl="0" eaLnBrk="1" latinLnBrk="0" hangingPunct="1">
+              <a:spcBef>
+                <a:spcPct val="20000"/>
+              </a:spcBef>
+              <a:buClr>
+                <a:schemeClr val="tx1"/>
+              </a:buClr>
+              <a:buFontTx/>
+              <a:buNone/>
+              <a:defRPr sz="2400" kern="1200">
+                <a:solidFill>
+                  <a:schemeClr val="bg1">
+                    <a:lumMod val="50000"/>
+                  </a:schemeClr>
+                </a:solidFill>
+                <a:latin typeface="Segoe UI Light" pitchFamily="34" charset="0"/>
+                <a:ea typeface="Segoe UI" pitchFamily="34" charset="0"/>
+                <a:cs typeface="Segoe UI" pitchFamily="34" charset="0"/>
+              </a:defRPr>
+            </a:lvl3pPr>
+            <a:lvl4pPr marL="1600200" indent="-228600" algn="l" defTabSz="914400" rtl="0" eaLnBrk="1" latinLnBrk="0" hangingPunct="1">
+              <a:spcBef>
+                <a:spcPct val="20000"/>
+              </a:spcBef>
+              <a:buFont typeface="Arial" pitchFamily="34" charset="0"/>
+              <a:buChar char="–"/>
+              <a:defRPr sz="2000" kern="1200">
+                <a:solidFill>
+                  <a:schemeClr val="bg1"/>
+                </a:solidFill>
+                <a:latin typeface="Segoe WP" pitchFamily="34" charset="0"/>
+                <a:ea typeface="Segoe UI" pitchFamily="34" charset="0"/>
+                <a:cs typeface="Segoe UI" pitchFamily="34" charset="0"/>
+              </a:defRPr>
+            </a:lvl4pPr>
+            <a:lvl5pPr marL="2057400" indent="-228600" algn="l" defTabSz="914400" rtl="0" eaLnBrk="1" latinLnBrk="0" hangingPunct="1">
+              <a:spcBef>
+                <a:spcPct val="20000"/>
+              </a:spcBef>
+              <a:buFont typeface="Arial" pitchFamily="34" charset="0"/>
+              <a:buChar char="»"/>
+              <a:defRPr sz="2000" kern="1200">
+                <a:solidFill>
+                  <a:schemeClr val="bg1"/>
+                </a:solidFill>
+                <a:latin typeface="Segoe WP" pitchFamily="34" charset="0"/>
+                <a:ea typeface="Segoe UI" pitchFamily="34" charset="0"/>
+                <a:cs typeface="Segoe UI" pitchFamily="34" charset="0"/>
+              </a:defRPr>
+            </a:lvl5pPr>
+            <a:lvl6pPr marL="2514600" indent="-228600" algn="l" defTabSz="914400" rtl="0" eaLnBrk="1" latinLnBrk="0" hangingPunct="1">
+              <a:spcBef>
+                <a:spcPct val="20000"/>
+              </a:spcBef>
+              <a:buFont typeface="Arial" pitchFamily="34" charset="0"/>
+              <a:buChar char="•"/>
+              <a:defRPr sz="2000" kern="1200">
+                <a:solidFill>
+                  <a:schemeClr val="tx1"/>
+                </a:solidFill>
+                <a:latin typeface="+mn-lt"/>
+                <a:ea typeface="+mn-ea"/>
+                <a:cs typeface="+mn-cs"/>
+              </a:defRPr>
+            </a:lvl6pPr>
+            <a:lvl7pPr marL="2971800" indent="-228600" algn="l" defTabSz="914400" rtl="0" eaLnBrk="1" latinLnBrk="0" hangingPunct="1">
+              <a:spcBef>
+                <a:spcPct val="20000"/>
+              </a:spcBef>
+              <a:buFont typeface="Arial" pitchFamily="34" charset="0"/>
+              <a:buChar char="•"/>
+              <a:defRPr sz="2000" kern="1200">
+                <a:solidFill>
+                  <a:schemeClr val="tx1"/>
+                </a:solidFill>
+                <a:latin typeface="+mn-lt"/>
+                <a:ea typeface="+mn-ea"/>
+                <a:cs typeface="+mn-cs"/>
+              </a:defRPr>
+            </a:lvl7pPr>
+            <a:lvl8pPr marL="3429000" indent="-228600" algn="l" defTabSz="914400" rtl="0" eaLnBrk="1" latinLnBrk="0" hangingPunct="1">
+              <a:spcBef>
+                <a:spcPct val="20000"/>
+              </a:spcBef>
+              <a:buFont typeface="Arial" pitchFamily="34" charset="0"/>
+              <a:buChar char="•"/>
+              <a:defRPr sz="2000" kern="1200">
+                <a:solidFill>
+                  <a:schemeClr val="tx1"/>
+                </a:solidFill>
+                <a:latin typeface="+mn-lt"/>
+                <a:ea typeface="+mn-ea"/>
+                <a:cs typeface="+mn-cs"/>
+              </a:defRPr>
+            </a:lvl8pPr>
+            <a:lvl9pPr marL="3886200" indent="-228600" algn="l" defTabSz="914400" rtl="0" eaLnBrk="1" latinLnBrk="0" hangingPunct="1">
+              <a:spcBef>
+                <a:spcPct val="20000"/>
+              </a:spcBef>
+              <a:buFont typeface="Arial" pitchFamily="34" charset="0"/>
+              <a:buChar char="•"/>
+              <a:defRPr sz="2000" kern="1200">
+                <a:solidFill>
+                  <a:schemeClr val="tx1"/>
+                </a:solidFill>
+                <a:latin typeface="+mn-lt"/>
+                <a:ea typeface="+mn-ea"/>
+                <a:cs typeface="+mn-cs"/>
+              </a:defRPr>
+            </a:lvl9pPr>
+          </a:lstStyle>
+          <a:p>
+            <a:r>
+              <a:rPr lang="pl-PL" dirty="0" smtClean="0"/>
+              <a:t>Hands On Lab</a:t>
+            </a:r>
+            <a:endParaRPr lang="en-CA" dirty="0"/>
+          </a:p>
+        </p:txBody>
+      </p:sp>
+      <p:sp>
+        <p:nvSpPr>
+          <p:cNvPr id="8" name="Content Placeholder 1"/>
+          <p:cNvSpPr txBox="1">
+            <a:spLocks/>
+          </p:cNvSpPr>
+          <p:nvPr/>
+        </p:nvSpPr>
+        <p:spPr>
+          <a:xfrm>
+            <a:off x="467544" y="3139010"/>
+            <a:ext cx="3096344" cy="1368152"/>
+          </a:xfrm>
+          <a:prstGeom prst="rect">
+            <a:avLst/>
+          </a:prstGeom>
+          <a:solidFill>
+            <a:schemeClr val="accent3"/>
+          </a:solidFill>
+        </p:spPr>
+        <p:txBody>
+          <a:bodyPr/>
+          <a:lstStyle>
+            <a:lvl1pPr marL="0" indent="0" algn="l" defTabSz="914400" rtl="0" eaLnBrk="1" latinLnBrk="0" hangingPunct="1">
+              <a:spcBef>
+                <a:spcPct val="20000"/>
+              </a:spcBef>
+              <a:buClr>
+                <a:schemeClr val="tx1"/>
+              </a:buClr>
+              <a:buFontTx/>
+              <a:buNone/>
+              <a:defRPr sz="3200" kern="1200">
+                <a:solidFill>
+                  <a:schemeClr val="bg1"/>
+                </a:solidFill>
+                <a:latin typeface="Segoe UI Light" pitchFamily="34" charset="0"/>
+                <a:ea typeface="Segoe UI" pitchFamily="34" charset="0"/>
+                <a:cs typeface="Segoe UI" pitchFamily="34" charset="0"/>
+              </a:defRPr>
+            </a:lvl1pPr>
+            <a:lvl2pPr marL="254250" indent="0" algn="l" defTabSz="914400" rtl="0" eaLnBrk="1" latinLnBrk="0" hangingPunct="1">
+              <a:spcBef>
+                <a:spcPct val="20000"/>
+              </a:spcBef>
+              <a:buClr>
+                <a:schemeClr val="tx1"/>
+              </a:buClr>
+              <a:buFontTx/>
+              <a:buNone/>
+              <a:defRPr sz="2800" kern="1200">
+                <a:solidFill>
+                  <a:schemeClr val="bg1">
+                    <a:lumMod val="75000"/>
+                  </a:schemeClr>
+                </a:solidFill>
+                <a:latin typeface="Segoe UI Light" pitchFamily="34" charset="0"/>
+                <a:ea typeface="Segoe UI" pitchFamily="34" charset="0"/>
+                <a:cs typeface="Segoe UI" pitchFamily="34" charset="0"/>
+              </a:defRPr>
+            </a:lvl2pPr>
+            <a:lvl3pPr marL="491400" indent="0" algn="l" defTabSz="914400" rtl="0" eaLnBrk="1" latinLnBrk="0" hangingPunct="1">
+              <a:spcBef>
+                <a:spcPct val="20000"/>
+              </a:spcBef>
+              <a:buClr>
+                <a:schemeClr val="tx1"/>
+              </a:buClr>
+              <a:buFontTx/>
+              <a:buNone/>
+              <a:defRPr sz="2400" kern="1200">
+                <a:solidFill>
+                  <a:schemeClr val="bg1">
+                    <a:lumMod val="50000"/>
+                  </a:schemeClr>
+                </a:solidFill>
+                <a:latin typeface="Segoe UI Light" pitchFamily="34" charset="0"/>
+                <a:ea typeface="Segoe UI" pitchFamily="34" charset="0"/>
+                <a:cs typeface="Segoe UI" pitchFamily="34" charset="0"/>
+              </a:defRPr>
+            </a:lvl3pPr>
+            <a:lvl4pPr marL="1600200" indent="-228600" algn="l" defTabSz="914400" rtl="0" eaLnBrk="1" latinLnBrk="0" hangingPunct="1">
+              <a:spcBef>
+                <a:spcPct val="20000"/>
+              </a:spcBef>
+              <a:buFont typeface="Arial" pitchFamily="34" charset="0"/>
+              <a:buChar char="–"/>
+              <a:defRPr sz="2000" kern="1200">
+                <a:solidFill>
+                  <a:schemeClr val="bg1"/>
+                </a:solidFill>
+                <a:latin typeface="Segoe WP" pitchFamily="34" charset="0"/>
+                <a:ea typeface="Segoe UI" pitchFamily="34" charset="0"/>
+                <a:cs typeface="Segoe UI" pitchFamily="34" charset="0"/>
+              </a:defRPr>
+            </a:lvl4pPr>
+            <a:lvl5pPr marL="2057400" indent="-228600" algn="l" defTabSz="914400" rtl="0" eaLnBrk="1" latinLnBrk="0" hangingPunct="1">
+              <a:spcBef>
+                <a:spcPct val="20000"/>
+              </a:spcBef>
+              <a:buFont typeface="Arial" pitchFamily="34" charset="0"/>
+              <a:buChar char="»"/>
+              <a:defRPr sz="2000" kern="1200">
+                <a:solidFill>
+                  <a:schemeClr val="bg1"/>
+                </a:solidFill>
+                <a:latin typeface="Segoe WP" pitchFamily="34" charset="0"/>
+                <a:ea typeface="Segoe UI" pitchFamily="34" charset="0"/>
+                <a:cs typeface="Segoe UI" pitchFamily="34" charset="0"/>
+              </a:defRPr>
+            </a:lvl5pPr>
+            <a:lvl6pPr marL="2514600" indent="-228600" algn="l" defTabSz="914400" rtl="0" eaLnBrk="1" latinLnBrk="0" hangingPunct="1">
+              <a:spcBef>
+                <a:spcPct val="20000"/>
+              </a:spcBef>
+              <a:buFont typeface="Arial" pitchFamily="34" charset="0"/>
+              <a:buChar char="•"/>
+              <a:defRPr sz="2000" kern="1200">
+                <a:solidFill>
+                  <a:schemeClr val="tx1"/>
+                </a:solidFill>
+                <a:latin typeface="+mn-lt"/>
+                <a:ea typeface="+mn-ea"/>
+                <a:cs typeface="+mn-cs"/>
+              </a:defRPr>
+            </a:lvl6pPr>
+            <a:lvl7pPr marL="2971800" indent="-228600" algn="l" defTabSz="914400" rtl="0" eaLnBrk="1" latinLnBrk="0" hangingPunct="1">
+              <a:spcBef>
+                <a:spcPct val="20000"/>
+              </a:spcBef>
+              <a:buFont typeface="Arial" pitchFamily="34" charset="0"/>
+              <a:buChar char="•"/>
+              <a:defRPr sz="2000" kern="1200">
+                <a:solidFill>
+                  <a:schemeClr val="tx1"/>
+                </a:solidFill>
+                <a:latin typeface="+mn-lt"/>
+                <a:ea typeface="+mn-ea"/>
+                <a:cs typeface="+mn-cs"/>
+              </a:defRPr>
+            </a:lvl7pPr>
+            <a:lvl8pPr marL="3429000" indent="-228600" algn="l" defTabSz="914400" rtl="0" eaLnBrk="1" latinLnBrk="0" hangingPunct="1">
+              <a:spcBef>
+                <a:spcPct val="20000"/>
+              </a:spcBef>
+              <a:buFont typeface="Arial" pitchFamily="34" charset="0"/>
+              <a:buChar char="•"/>
+              <a:defRPr sz="2000" kern="1200">
+                <a:solidFill>
+                  <a:schemeClr val="tx1"/>
+                </a:solidFill>
+                <a:latin typeface="+mn-lt"/>
+                <a:ea typeface="+mn-ea"/>
+                <a:cs typeface="+mn-cs"/>
+              </a:defRPr>
+            </a:lvl8pPr>
+            <a:lvl9pPr marL="3886200" indent="-228600" algn="l" defTabSz="914400" rtl="0" eaLnBrk="1" latinLnBrk="0" hangingPunct="1">
+              <a:spcBef>
+                <a:spcPct val="20000"/>
+              </a:spcBef>
+              <a:buFont typeface="Arial" pitchFamily="34" charset="0"/>
+              <a:buChar char="•"/>
+              <a:defRPr sz="2000" kern="1200">
+                <a:solidFill>
+                  <a:schemeClr val="tx1"/>
+                </a:solidFill>
+                <a:latin typeface="+mn-lt"/>
+                <a:ea typeface="+mn-ea"/>
+                <a:cs typeface="+mn-cs"/>
+              </a:defRPr>
+            </a:lvl9pPr>
+          </a:lstStyle>
+          <a:p>
+            <a:r>
+              <a:rPr lang="pl-PL" dirty="0" smtClean="0"/>
+              <a:t>How does the Internet work?</a:t>
             </a:r>
             <a:endParaRPr lang="en-CA" dirty="0"/>
           </a:p>
@@ -5183,7 +6510,7 @@
     </p:spTree>
     <p:extLst>
       <p:ext uri="{BB962C8B-B14F-4D97-AF65-F5344CB8AC3E}">
-        <p14:creationId xmlns:p14="http://schemas.microsoft.com/office/powerpoint/2010/main" val="2932275863"/>
+        <p14:creationId xmlns:p14="http://schemas.microsoft.com/office/powerpoint/2010/main" val="976054763"/>
       </p:ext>
     </p:extLst>
   </p:cSld>

</xml_diff>

<commit_message>
Almost finished theoretical introduction. Added OOP diagram.
</commit_message>
<xml_diff>
--- a/Programming Made Easy.pptx
+++ b/Programming Made Easy.pptx
@@ -5,7 +5,7 @@
     <p:sldMasterId id="2147483660" r:id="rId1"/>
   </p:sldMasterIdLst>
   <p:notesMasterIdLst>
-    <p:notesMasterId r:id="rId18"/>
+    <p:notesMasterId r:id="rId19"/>
   </p:notesMasterIdLst>
   <p:sldIdLst>
     <p:sldId id="256" r:id="rId2"/>
@@ -22,8 +22,9 @@
     <p:sldId id="268" r:id="rId13"/>
     <p:sldId id="269" r:id="rId14"/>
     <p:sldId id="270" r:id="rId15"/>
-    <p:sldId id="271" r:id="rId16"/>
-    <p:sldId id="273" r:id="rId17"/>
+    <p:sldId id="273" r:id="rId16"/>
+    <p:sldId id="274" r:id="rId17"/>
+    <p:sldId id="275" r:id="rId18"/>
   </p:sldIdLst>
   <p:sldSz cx="9144000" cy="6858000" type="screen4x3"/>
   <p:notesSz cx="6858000" cy="9144000"/>
@@ -4004,6 +4005,20 @@
             <a:r>
               <a:rPr lang="pl-PL" baseline="0" dirty="0" smtClean="0"/>
               <a:t>Web application – works on a server side, presented to a user by a browser. Usually OS and browser agnostic. Sometimes use technology that requires specific OS/browser. Example: Flash doesn’t work on iOS. Silverlight has no official and current implementation for Linux (works on Windows and Mac only)</a:t>
+            </a:r>
+          </a:p>
+          <a:p>
+            <a:r>
+              <a:rPr lang="pl-PL" dirty="0" smtClean="0"/>
+              <a:t>Embedded applications – robotic rovers, washing</a:t>
+            </a:r>
+            <a:r>
+              <a:rPr lang="pl-PL" baseline="0" dirty="0" smtClean="0"/>
+              <a:t> machines, </a:t>
+            </a:r>
+            <a:r>
+              <a:rPr lang="pl-PL" baseline="0" smtClean="0"/>
+              <a:t>home a</a:t>
             </a:r>
             <a:endParaRPr lang="en-CA" dirty="0"/>
           </a:p>
@@ -11699,93 +11714,6 @@
           <a:chExt cx="0" cy="0"/>
         </a:xfrm>
       </p:grpSpPr>
-      <p:sp>
-        <p:nvSpPr>
-          <p:cNvPr id="2" name="Content Placeholder 1"/>
-          <p:cNvSpPr>
-            <a:spLocks noGrp="1"/>
-          </p:cNvSpPr>
-          <p:nvPr>
-            <p:ph idx="1"/>
-          </p:nvPr>
-        </p:nvSpPr>
-        <p:spPr/>
-        <p:txBody>
-          <a:bodyPr/>
-          <a:lstStyle/>
-          <a:p>
-            <a:endParaRPr lang="en-CA"/>
-          </a:p>
-        </p:txBody>
-      </p:sp>
-      <p:sp>
-        <p:nvSpPr>
-          <p:cNvPr id="3" name="Title 2"/>
-          <p:cNvSpPr>
-            <a:spLocks noGrp="1"/>
-          </p:cNvSpPr>
-          <p:nvPr>
-            <p:ph type="title"/>
-          </p:nvPr>
-        </p:nvSpPr>
-        <p:spPr/>
-        <p:txBody>
-          <a:bodyPr/>
-          <a:lstStyle/>
-          <a:p>
-            <a:r>
-              <a:rPr lang="pl-PL" dirty="0" smtClean="0"/>
-              <a:t>The Web</a:t>
-            </a:r>
-            <a:endParaRPr lang="en-CA" dirty="0"/>
-          </a:p>
-        </p:txBody>
-      </p:sp>
-    </p:spTree>
-    <p:extLst>
-      <p:ext uri="{BB962C8B-B14F-4D97-AF65-F5344CB8AC3E}">
-        <p14:creationId xmlns:p14="http://schemas.microsoft.com/office/powerpoint/2010/main" val="3171373418"/>
-      </p:ext>
-    </p:extLst>
-  </p:cSld>
-  <p:clrMapOvr>
-    <a:masterClrMapping/>
-  </p:clrMapOvr>
-  <mc:AlternateContent xmlns:mc="http://schemas.openxmlformats.org/markup-compatibility/2006" xmlns:p14="http://schemas.microsoft.com/office/powerpoint/2010/main">
-    <mc:Choice Requires="p14">
-      <p:transition spd="slow" p14:dur="2000"/>
-    </mc:Choice>
-    <mc:Fallback xmlns="">
-      <p:transition spd="slow"/>
-    </mc:Fallback>
-  </mc:AlternateContent>
-  <p:timing>
-    <p:tnLst>
-      <p:par>
-        <p:cTn id="1" dur="indefinite" restart="never" nodeType="tmRoot"/>
-      </p:par>
-    </p:tnLst>
-  </p:timing>
-</p:sld>
-</file>
-
-<file path=ppt/slides/slide16.xml><?xml version="1.0" encoding="utf-8"?>
-<p:sld xmlns:a="http://schemas.openxmlformats.org/drawingml/2006/main" xmlns:r="http://schemas.openxmlformats.org/officeDocument/2006/relationships" xmlns:p="http://schemas.openxmlformats.org/presentationml/2006/main">
-  <p:cSld>
-    <p:spTree>
-      <p:nvGrpSpPr>
-        <p:cNvPr id="1" name=""/>
-        <p:cNvGrpSpPr/>
-        <p:nvPr/>
-      </p:nvGrpSpPr>
-      <p:grpSpPr>
-        <a:xfrm>
-          <a:off x="0" y="0"/>
-          <a:ext cx="0" cy="0"/>
-          <a:chOff x="0" y="0"/>
-          <a:chExt cx="0" cy="0"/>
-        </a:xfrm>
-      </p:grpSpPr>
       <p:graphicFrame>
         <p:nvGraphicFramePr>
           <p:cNvPr id="4" name="Content Placeholder 3"/>
@@ -11828,7 +11756,7 @@
           <a:p>
             <a:r>
               <a:rPr lang="pl-PL" dirty="0" smtClean="0"/>
-              <a:t>Web request</a:t>
+              <a:t>The web - Web request</a:t>
             </a:r>
             <a:endParaRPr lang="en-CA" dirty="0"/>
           </a:p>
@@ -11856,6 +11784,1537 @@
     <p:tnLst>
       <p:par>
         <p:cTn id="1" dur="indefinite" restart="never" nodeType="tmRoot"/>
+      </p:par>
+    </p:tnLst>
+  </p:timing>
+</p:sld>
+</file>
+
+<file path=ppt/slides/slide16.xml><?xml version="1.0" encoding="utf-8"?>
+<p:sld xmlns:a="http://schemas.openxmlformats.org/drawingml/2006/main" xmlns:r="http://schemas.openxmlformats.org/officeDocument/2006/relationships" xmlns:p="http://schemas.openxmlformats.org/presentationml/2006/main">
+  <p:cSld>
+    <p:spTree>
+      <p:nvGrpSpPr>
+        <p:cNvPr id="1" name=""/>
+        <p:cNvGrpSpPr/>
+        <p:nvPr/>
+      </p:nvGrpSpPr>
+      <p:grpSpPr>
+        <a:xfrm>
+          <a:off x="0" y="0"/>
+          <a:ext cx="0" cy="0"/>
+          <a:chOff x="0" y="0"/>
+          <a:chExt cx="0" cy="0"/>
+        </a:xfrm>
+      </p:grpSpPr>
+      <p:sp>
+        <p:nvSpPr>
+          <p:cNvPr id="3" name="Title 2"/>
+          <p:cNvSpPr>
+            <a:spLocks noGrp="1"/>
+          </p:cNvSpPr>
+          <p:nvPr>
+            <p:ph type="title"/>
+          </p:nvPr>
+        </p:nvSpPr>
+        <p:spPr/>
+        <p:txBody>
+          <a:bodyPr/>
+          <a:lstStyle/>
+          <a:p>
+            <a:r>
+              <a:rPr lang="pl-PL" dirty="0" smtClean="0"/>
+              <a:t>Object Oriented Programming</a:t>
+            </a:r>
+            <a:endParaRPr lang="en-CA" dirty="0"/>
+          </a:p>
+        </p:txBody>
+      </p:sp>
+      <p:sp>
+        <p:nvSpPr>
+          <p:cNvPr id="4" name="Content Placeholder 3"/>
+          <p:cNvSpPr>
+            <a:spLocks noGrp="1"/>
+          </p:cNvSpPr>
+          <p:nvPr>
+            <p:ph sz="quarter" idx="10"/>
+          </p:nvPr>
+        </p:nvSpPr>
+        <p:spPr/>
+        <p:txBody>
+          <a:bodyPr/>
+          <a:lstStyle/>
+          <a:p>
+            <a:r>
+              <a:rPr lang="pl-PL" dirty="0" smtClean="0"/>
+              <a:t>Programming paradigm</a:t>
+            </a:r>
+            <a:endParaRPr lang="en-CA" dirty="0"/>
+          </a:p>
+        </p:txBody>
+      </p:sp>
+      <p:sp>
+        <p:nvSpPr>
+          <p:cNvPr id="5" name="Content Placeholder 4"/>
+          <p:cNvSpPr>
+            <a:spLocks noGrp="1"/>
+          </p:cNvSpPr>
+          <p:nvPr>
+            <p:ph sz="quarter" idx="11"/>
+          </p:nvPr>
+        </p:nvSpPr>
+        <p:spPr/>
+        <p:txBody>
+          <a:bodyPr/>
+          <a:lstStyle/>
+          <a:p>
+            <a:r>
+              <a:rPr lang="pl-PL" dirty="0" smtClean="0"/>
+              <a:t>Using objects</a:t>
+            </a:r>
+            <a:endParaRPr lang="en-CA" dirty="0"/>
+          </a:p>
+        </p:txBody>
+      </p:sp>
+      <p:sp>
+        <p:nvSpPr>
+          <p:cNvPr id="6" name="Content Placeholder 5"/>
+          <p:cNvSpPr>
+            <a:spLocks noGrp="1"/>
+          </p:cNvSpPr>
+          <p:nvPr>
+            <p:ph sz="quarter" idx="12"/>
+          </p:nvPr>
+        </p:nvSpPr>
+        <p:spPr/>
+        <p:txBody>
+          <a:bodyPr/>
+          <a:lstStyle/>
+          <a:p>
+            <a:r>
+              <a:rPr lang="pl-PL" sz="2800" dirty="0" smtClean="0"/>
+              <a:t>Each object is an instance of a class</a:t>
+            </a:r>
+            <a:endParaRPr lang="en-CA" sz="2800" dirty="0"/>
+          </a:p>
+        </p:txBody>
+      </p:sp>
+      <p:sp>
+        <p:nvSpPr>
+          <p:cNvPr id="7" name="Content Placeholder 6"/>
+          <p:cNvSpPr>
+            <a:spLocks noGrp="1"/>
+          </p:cNvSpPr>
+          <p:nvPr>
+            <p:ph sz="quarter" idx="13"/>
+          </p:nvPr>
+        </p:nvSpPr>
+        <p:spPr/>
+        <p:txBody>
+          <a:bodyPr/>
+          <a:lstStyle/>
+          <a:p>
+            <a:endParaRPr lang="en-CA"/>
+          </a:p>
+        </p:txBody>
+      </p:sp>
+      <p:sp>
+        <p:nvSpPr>
+          <p:cNvPr id="8" name="Content Placeholder 7"/>
+          <p:cNvSpPr>
+            <a:spLocks noGrp="1"/>
+          </p:cNvSpPr>
+          <p:nvPr>
+            <p:ph sz="quarter" idx="14"/>
+          </p:nvPr>
+        </p:nvSpPr>
+        <p:spPr/>
+        <p:txBody>
+          <a:bodyPr/>
+          <a:lstStyle/>
+          <a:p>
+            <a:endParaRPr lang="en-CA"/>
+          </a:p>
+        </p:txBody>
+      </p:sp>
+      <p:sp>
+        <p:nvSpPr>
+          <p:cNvPr id="9" name="Content Placeholder 8"/>
+          <p:cNvSpPr>
+            <a:spLocks noGrp="1"/>
+          </p:cNvSpPr>
+          <p:nvPr>
+            <p:ph sz="quarter" idx="15"/>
+          </p:nvPr>
+        </p:nvSpPr>
+        <p:spPr/>
+        <p:txBody>
+          <a:bodyPr/>
+          <a:lstStyle/>
+          <a:p>
+            <a:r>
+              <a:rPr lang="pl-PL" sz="2800" dirty="0" smtClean="0"/>
+              <a:t>Each class has fields and methods</a:t>
+            </a:r>
+            <a:endParaRPr lang="en-CA" sz="2800" dirty="0"/>
+          </a:p>
+        </p:txBody>
+      </p:sp>
+    </p:spTree>
+    <p:extLst>
+      <p:ext uri="{BB962C8B-B14F-4D97-AF65-F5344CB8AC3E}">
+        <p14:creationId xmlns:p14="http://schemas.microsoft.com/office/powerpoint/2010/main" val="2805885200"/>
+      </p:ext>
+    </p:extLst>
+  </p:cSld>
+  <p:clrMapOvr>
+    <a:masterClrMapping/>
+  </p:clrMapOvr>
+  <mc:AlternateContent xmlns:mc="http://schemas.openxmlformats.org/markup-compatibility/2006" xmlns:p14="http://schemas.microsoft.com/office/powerpoint/2010/main">
+    <mc:Choice Requires="p14">
+      <p:transition spd="slow" p14:dur="2000"/>
+    </mc:Choice>
+    <mc:Fallback xmlns="">
+      <p:transition spd="slow"/>
+    </mc:Fallback>
+  </mc:AlternateContent>
+  <p:timing>
+    <p:tnLst>
+      <p:par>
+        <p:cTn id="1" dur="indefinite" restart="never" nodeType="tmRoot"/>
+      </p:par>
+    </p:tnLst>
+  </p:timing>
+</p:sld>
+</file>
+
+<file path=ppt/slides/slide17.xml><?xml version="1.0" encoding="utf-8"?>
+<p:sld xmlns:a="http://schemas.openxmlformats.org/drawingml/2006/main" xmlns:r="http://schemas.openxmlformats.org/officeDocument/2006/relationships" xmlns:p="http://schemas.openxmlformats.org/presentationml/2006/main">
+  <p:cSld>
+    <p:spTree>
+      <p:nvGrpSpPr>
+        <p:cNvPr id="1" name=""/>
+        <p:cNvGrpSpPr/>
+        <p:nvPr/>
+      </p:nvGrpSpPr>
+      <p:grpSpPr>
+        <a:xfrm>
+          <a:off x="0" y="0"/>
+          <a:ext cx="0" cy="0"/>
+          <a:chOff x="0" y="0"/>
+          <a:chExt cx="0" cy="0"/>
+        </a:xfrm>
+      </p:grpSpPr>
+      <p:sp>
+        <p:nvSpPr>
+          <p:cNvPr id="3" name="Title 2"/>
+          <p:cNvSpPr>
+            <a:spLocks noGrp="1"/>
+          </p:cNvSpPr>
+          <p:nvPr>
+            <p:ph type="title"/>
+          </p:nvPr>
+        </p:nvSpPr>
+        <p:spPr/>
+        <p:txBody>
+          <a:bodyPr/>
+          <a:lstStyle/>
+          <a:p>
+            <a:r>
+              <a:rPr lang="pl-PL" dirty="0" smtClean="0"/>
+              <a:t>Object Oriented Programming</a:t>
+            </a:r>
+            <a:endParaRPr lang="en-CA" dirty="0"/>
+          </a:p>
+        </p:txBody>
+      </p:sp>
+      <p:pic>
+        <p:nvPicPr>
+          <p:cNvPr id="4101" name="Picture 5"/>
+          <p:cNvPicPr>
+            <a:picLocks noChangeAspect="1" noChangeArrowheads="1"/>
+          </p:cNvPicPr>
+          <p:nvPr/>
+        </p:nvPicPr>
+        <p:blipFill>
+          <a:blip r:embed="rId2">
+            <a:extLst>
+              <a:ext uri="{28A0092B-C50C-407E-A947-70E740481C1C}">
+                <a14:useLocalDpi xmlns:a14="http://schemas.microsoft.com/office/drawing/2010/main" val="0"/>
+              </a:ext>
+            </a:extLst>
+          </a:blip>
+          <a:srcRect/>
+          <a:stretch>
+            <a:fillRect/>
+          </a:stretch>
+        </p:blipFill>
+        <p:spPr bwMode="auto">
+          <a:xfrm>
+            <a:off x="666622" y="2118715"/>
+            <a:ext cx="2165987" cy="1612457"/>
+          </a:xfrm>
+          <a:prstGeom prst="rect">
+            <a:avLst/>
+          </a:prstGeom>
+          <a:noFill/>
+          <a:ln>
+            <a:noFill/>
+          </a:ln>
+          <a:effectLst/>
+          <a:extLst>
+            <a:ext uri="{909E8E84-426E-40DD-AFC4-6F175D3DCCD1}">
+              <a14:hiddenFill xmlns:a14="http://schemas.microsoft.com/office/drawing/2010/main">
+                <a:solidFill>
+                  <a:schemeClr val="accent1"/>
+                </a:solidFill>
+              </a14:hiddenFill>
+            </a:ext>
+            <a:ext uri="{91240B29-F687-4F45-9708-019B960494DF}">
+              <a14:hiddenLine xmlns:a14="http://schemas.microsoft.com/office/drawing/2010/main" w="9525">
+                <a:solidFill>
+                  <a:schemeClr val="tx1"/>
+                </a:solidFill>
+                <a:miter lim="800000"/>
+                <a:headEnd/>
+                <a:tailEnd/>
+              </a14:hiddenLine>
+            </a:ext>
+            <a:ext uri="{AF507438-7753-43E0-B8FC-AC1667EBCBE1}">
+              <a14:hiddenEffects xmlns:a14="http://schemas.microsoft.com/office/drawing/2010/main">
+                <a:effectLst>
+                  <a:outerShdw dist="35921" dir="2700000" algn="ctr" rotWithShape="0">
+                    <a:schemeClr val="bg2"/>
+                  </a:outerShdw>
+                </a:effectLst>
+              </a14:hiddenEffects>
+            </a:ext>
+          </a:extLst>
+        </p:spPr>
+      </p:pic>
+      <p:pic>
+        <p:nvPicPr>
+          <p:cNvPr id="4104" name="Picture 8"/>
+          <p:cNvPicPr>
+            <a:picLocks noChangeAspect="1" noChangeArrowheads="1"/>
+          </p:cNvPicPr>
+          <p:nvPr/>
+        </p:nvPicPr>
+        <p:blipFill>
+          <a:blip r:embed="rId3">
+            <a:extLst>
+              <a:ext uri="{28A0092B-C50C-407E-A947-70E740481C1C}">
+                <a14:useLocalDpi xmlns:a14="http://schemas.microsoft.com/office/drawing/2010/main" val="0"/>
+              </a:ext>
+            </a:extLst>
+          </a:blip>
+          <a:srcRect/>
+          <a:stretch>
+            <a:fillRect/>
+          </a:stretch>
+        </p:blipFill>
+        <p:spPr bwMode="auto">
+          <a:xfrm>
+            <a:off x="663901" y="2107643"/>
+            <a:ext cx="8375357" cy="1650795"/>
+          </a:xfrm>
+          <a:prstGeom prst="rect">
+            <a:avLst/>
+          </a:prstGeom>
+          <a:noFill/>
+          <a:ln>
+            <a:noFill/>
+          </a:ln>
+          <a:effectLst/>
+          <a:extLst>
+            <a:ext uri="{909E8E84-426E-40DD-AFC4-6F175D3DCCD1}">
+              <a14:hiddenFill xmlns:a14="http://schemas.microsoft.com/office/drawing/2010/main">
+                <a:solidFill>
+                  <a:schemeClr val="accent1"/>
+                </a:solidFill>
+              </a14:hiddenFill>
+            </a:ext>
+            <a:ext uri="{91240B29-F687-4F45-9708-019B960494DF}">
+              <a14:hiddenLine xmlns:a14="http://schemas.microsoft.com/office/drawing/2010/main" w="9525">
+                <a:solidFill>
+                  <a:schemeClr val="tx1"/>
+                </a:solidFill>
+                <a:miter lim="800000"/>
+                <a:headEnd/>
+                <a:tailEnd/>
+              </a14:hiddenLine>
+            </a:ext>
+            <a:ext uri="{AF507438-7753-43E0-B8FC-AC1667EBCBE1}">
+              <a14:hiddenEffects xmlns:a14="http://schemas.microsoft.com/office/drawing/2010/main">
+                <a:effectLst>
+                  <a:outerShdw dist="35921" dir="2700000" algn="ctr" rotWithShape="0">
+                    <a:schemeClr val="bg2"/>
+                  </a:outerShdw>
+                </a:effectLst>
+              </a14:hiddenEffects>
+            </a:ext>
+          </a:extLst>
+        </p:spPr>
+      </p:pic>
+      <p:pic>
+        <p:nvPicPr>
+          <p:cNvPr id="4105" name="Picture 9"/>
+          <p:cNvPicPr>
+            <a:picLocks noChangeAspect="1" noChangeArrowheads="1"/>
+          </p:cNvPicPr>
+          <p:nvPr/>
+        </p:nvPicPr>
+        <p:blipFill>
+          <a:blip r:embed="rId4">
+            <a:extLst>
+              <a:ext uri="{28A0092B-C50C-407E-A947-70E740481C1C}">
+                <a14:useLocalDpi xmlns:a14="http://schemas.microsoft.com/office/drawing/2010/main" val="0"/>
+              </a:ext>
+            </a:extLst>
+          </a:blip>
+          <a:srcRect/>
+          <a:stretch>
+            <a:fillRect/>
+          </a:stretch>
+        </p:blipFill>
+        <p:spPr bwMode="auto">
+          <a:xfrm>
+            <a:off x="663901" y="2119831"/>
+            <a:ext cx="7493659" cy="3882853"/>
+          </a:xfrm>
+          <a:prstGeom prst="rect">
+            <a:avLst/>
+          </a:prstGeom>
+          <a:noFill/>
+          <a:ln>
+            <a:noFill/>
+          </a:ln>
+          <a:effectLst/>
+          <a:extLst>
+            <a:ext uri="{909E8E84-426E-40DD-AFC4-6F175D3DCCD1}">
+              <a14:hiddenFill xmlns:a14="http://schemas.microsoft.com/office/drawing/2010/main">
+                <a:solidFill>
+                  <a:schemeClr val="accent1"/>
+                </a:solidFill>
+              </a14:hiddenFill>
+            </a:ext>
+            <a:ext uri="{91240B29-F687-4F45-9708-019B960494DF}">
+              <a14:hiddenLine xmlns:a14="http://schemas.microsoft.com/office/drawing/2010/main" w="9525">
+                <a:solidFill>
+                  <a:schemeClr val="tx1"/>
+                </a:solidFill>
+                <a:miter lim="800000"/>
+                <a:headEnd/>
+                <a:tailEnd/>
+              </a14:hiddenLine>
+            </a:ext>
+            <a:ext uri="{AF507438-7753-43E0-B8FC-AC1667EBCBE1}">
+              <a14:hiddenEffects xmlns:a14="http://schemas.microsoft.com/office/drawing/2010/main">
+                <a:effectLst>
+                  <a:outerShdw dist="35921" dir="2700000" algn="ctr" rotWithShape="0">
+                    <a:schemeClr val="bg2"/>
+                  </a:outerShdw>
+                </a:effectLst>
+              </a14:hiddenEffects>
+            </a:ext>
+          </a:extLst>
+        </p:spPr>
+      </p:pic>
+      <p:pic>
+        <p:nvPicPr>
+          <p:cNvPr id="4106" name="Picture 10"/>
+          <p:cNvPicPr>
+            <a:picLocks noChangeAspect="1" noChangeArrowheads="1"/>
+          </p:cNvPicPr>
+          <p:nvPr/>
+        </p:nvPicPr>
+        <p:blipFill>
+          <a:blip r:embed="rId5">
+            <a:extLst>
+              <a:ext uri="{28A0092B-C50C-407E-A947-70E740481C1C}">
+                <a14:useLocalDpi xmlns:a14="http://schemas.microsoft.com/office/drawing/2010/main" val="0"/>
+              </a:ext>
+            </a:extLst>
+          </a:blip>
+          <a:srcRect/>
+          <a:stretch>
+            <a:fillRect/>
+          </a:stretch>
+        </p:blipFill>
+        <p:spPr bwMode="auto">
+          <a:xfrm>
+            <a:off x="251520" y="2119831"/>
+            <a:ext cx="8683212" cy="3895041"/>
+          </a:xfrm>
+          <a:prstGeom prst="rect">
+            <a:avLst/>
+          </a:prstGeom>
+          <a:noFill/>
+          <a:ln>
+            <a:noFill/>
+          </a:ln>
+          <a:effectLst/>
+          <a:extLst>
+            <a:ext uri="{909E8E84-426E-40DD-AFC4-6F175D3DCCD1}">
+              <a14:hiddenFill xmlns:a14="http://schemas.microsoft.com/office/drawing/2010/main">
+                <a:solidFill>
+                  <a:schemeClr val="accent1"/>
+                </a:solidFill>
+              </a14:hiddenFill>
+            </a:ext>
+            <a:ext uri="{91240B29-F687-4F45-9708-019B960494DF}">
+              <a14:hiddenLine xmlns:a14="http://schemas.microsoft.com/office/drawing/2010/main" w="9525">
+                <a:solidFill>
+                  <a:schemeClr val="tx1"/>
+                </a:solidFill>
+                <a:miter lim="800000"/>
+                <a:headEnd/>
+                <a:tailEnd/>
+              </a14:hiddenLine>
+            </a:ext>
+            <a:ext uri="{AF507438-7753-43E0-B8FC-AC1667EBCBE1}">
+              <a14:hiddenEffects xmlns:a14="http://schemas.microsoft.com/office/drawing/2010/main">
+                <a:effectLst>
+                  <a:outerShdw dist="35921" dir="2700000" algn="ctr" rotWithShape="0">
+                    <a:schemeClr val="bg2"/>
+                  </a:outerShdw>
+                </a:effectLst>
+              </a14:hiddenEffects>
+            </a:ext>
+          </a:extLst>
+        </p:spPr>
+      </p:pic>
+      <p:pic>
+        <p:nvPicPr>
+          <p:cNvPr id="4107" name="Picture 11"/>
+          <p:cNvPicPr>
+            <a:picLocks noChangeAspect="1" noChangeArrowheads="1"/>
+          </p:cNvPicPr>
+          <p:nvPr/>
+        </p:nvPicPr>
+        <p:blipFill>
+          <a:blip r:embed="rId6">
+            <a:extLst>
+              <a:ext uri="{28A0092B-C50C-407E-A947-70E740481C1C}">
+                <a14:useLocalDpi xmlns:a14="http://schemas.microsoft.com/office/drawing/2010/main" val="0"/>
+              </a:ext>
+            </a:extLst>
+          </a:blip>
+          <a:srcRect/>
+          <a:stretch>
+            <a:fillRect/>
+          </a:stretch>
+        </p:blipFill>
+        <p:spPr bwMode="auto">
+          <a:xfrm>
+            <a:off x="251520" y="2143912"/>
+            <a:ext cx="8620704" cy="3373319"/>
+          </a:xfrm>
+          <a:prstGeom prst="rect">
+            <a:avLst/>
+          </a:prstGeom>
+          <a:noFill/>
+          <a:ln>
+            <a:noFill/>
+          </a:ln>
+          <a:effectLst/>
+          <a:extLst>
+            <a:ext uri="{909E8E84-426E-40DD-AFC4-6F175D3DCCD1}">
+              <a14:hiddenFill xmlns:a14="http://schemas.microsoft.com/office/drawing/2010/main">
+                <a:solidFill>
+                  <a:schemeClr val="accent1"/>
+                </a:solidFill>
+              </a14:hiddenFill>
+            </a:ext>
+            <a:ext uri="{91240B29-F687-4F45-9708-019B960494DF}">
+              <a14:hiddenLine xmlns:a14="http://schemas.microsoft.com/office/drawing/2010/main" w="9525">
+                <a:solidFill>
+                  <a:schemeClr val="tx1"/>
+                </a:solidFill>
+                <a:miter lim="800000"/>
+                <a:headEnd/>
+                <a:tailEnd/>
+              </a14:hiddenLine>
+            </a:ext>
+            <a:ext uri="{AF507438-7753-43E0-B8FC-AC1667EBCBE1}">
+              <a14:hiddenEffects xmlns:a14="http://schemas.microsoft.com/office/drawing/2010/main">
+                <a:effectLst>
+                  <a:outerShdw dist="35921" dir="2700000" algn="ctr" rotWithShape="0">
+                    <a:schemeClr val="bg2"/>
+                  </a:outerShdw>
+                </a:effectLst>
+              </a14:hiddenEffects>
+            </a:ext>
+          </a:extLst>
+        </p:spPr>
+      </p:pic>
+      <p:pic>
+        <p:nvPicPr>
+          <p:cNvPr id="4109" name="Picture 13"/>
+          <p:cNvPicPr>
+            <a:picLocks noChangeAspect="1" noChangeArrowheads="1"/>
+          </p:cNvPicPr>
+          <p:nvPr/>
+        </p:nvPicPr>
+        <p:blipFill>
+          <a:blip r:embed="rId7">
+            <a:extLst>
+              <a:ext uri="{28A0092B-C50C-407E-A947-70E740481C1C}">
+                <a14:useLocalDpi xmlns:a14="http://schemas.microsoft.com/office/drawing/2010/main" val="0"/>
+              </a:ext>
+            </a:extLst>
+          </a:blip>
+          <a:srcRect/>
+          <a:stretch>
+            <a:fillRect/>
+          </a:stretch>
+        </p:blipFill>
+        <p:spPr bwMode="auto">
+          <a:xfrm>
+            <a:off x="231660" y="2143912"/>
+            <a:ext cx="8708595" cy="3858772"/>
+          </a:xfrm>
+          <a:prstGeom prst="rect">
+            <a:avLst/>
+          </a:prstGeom>
+          <a:noFill/>
+          <a:ln>
+            <a:noFill/>
+          </a:ln>
+          <a:effectLst/>
+          <a:extLst>
+            <a:ext uri="{909E8E84-426E-40DD-AFC4-6F175D3DCCD1}">
+              <a14:hiddenFill xmlns:a14="http://schemas.microsoft.com/office/drawing/2010/main">
+                <a:solidFill>
+                  <a:schemeClr val="accent1"/>
+                </a:solidFill>
+              </a14:hiddenFill>
+            </a:ext>
+            <a:ext uri="{91240B29-F687-4F45-9708-019B960494DF}">
+              <a14:hiddenLine xmlns:a14="http://schemas.microsoft.com/office/drawing/2010/main" w="9525">
+                <a:solidFill>
+                  <a:schemeClr val="tx1"/>
+                </a:solidFill>
+                <a:miter lim="800000"/>
+                <a:headEnd/>
+                <a:tailEnd/>
+              </a14:hiddenLine>
+            </a:ext>
+            <a:ext uri="{AF507438-7753-43E0-B8FC-AC1667EBCBE1}">
+              <a14:hiddenEffects xmlns:a14="http://schemas.microsoft.com/office/drawing/2010/main">
+                <a:effectLst>
+                  <a:outerShdw dist="35921" dir="2700000" algn="ctr" rotWithShape="0">
+                    <a:schemeClr val="bg2"/>
+                  </a:outerShdw>
+                </a:effectLst>
+              </a14:hiddenEffects>
+            </a:ext>
+          </a:extLst>
+        </p:spPr>
+      </p:pic>
+    </p:spTree>
+    <p:extLst>
+      <p:ext uri="{BB962C8B-B14F-4D97-AF65-F5344CB8AC3E}">
+        <p14:creationId xmlns:p14="http://schemas.microsoft.com/office/powerpoint/2010/main" val="1567495271"/>
+      </p:ext>
+    </p:extLst>
+  </p:cSld>
+  <p:clrMapOvr>
+    <a:masterClrMapping/>
+  </p:clrMapOvr>
+  <mc:AlternateContent xmlns:mc="http://schemas.openxmlformats.org/markup-compatibility/2006" xmlns:p14="http://schemas.microsoft.com/office/powerpoint/2010/main">
+    <mc:Choice Requires="p14">
+      <p:transition spd="slow" p14:dur="2000"/>
+    </mc:Choice>
+    <mc:Fallback xmlns="">
+      <p:transition spd="slow"/>
+    </mc:Fallback>
+  </mc:AlternateContent>
+  <p:timing>
+    <p:tnLst>
+      <p:par>
+        <p:cTn id="1" dur="indefinite" restart="never" nodeType="tmRoot">
+          <p:childTnLst>
+            <p:seq concurrent="1" nextAc="seek">
+              <p:cTn id="2" dur="indefinite" nodeType="mainSeq">
+                <p:childTnLst>
+                  <p:par>
+                    <p:cTn id="3" fill="hold">
+                      <p:stCondLst>
+                        <p:cond delay="indefinite"/>
+                        <p:cond evt="onBegin" delay="0">
+                          <p:tn val="2"/>
+                        </p:cond>
+                      </p:stCondLst>
+                      <p:childTnLst>
+                        <p:par>
+                          <p:cTn id="4" fill="hold">
+                            <p:stCondLst>
+                              <p:cond delay="0"/>
+                            </p:stCondLst>
+                            <p:childTnLst>
+                              <p:par>
+                                <p:cTn id="5" presetID="10" presetClass="entr" presetSubtype="0" fill="hold" nodeType="afterEffect">
+                                  <p:stCondLst>
+                                    <p:cond delay="0"/>
+                                  </p:stCondLst>
+                                  <p:childTnLst>
+                                    <p:set>
+                                      <p:cBhvr>
+                                        <p:cTn id="6" dur="1" fill="hold">
+                                          <p:stCondLst>
+                                            <p:cond delay="0"/>
+                                          </p:stCondLst>
+                                        </p:cTn>
+                                        <p:tgtEl>
+                                          <p:spTgt spid="4101"/>
+                                        </p:tgtEl>
+                                        <p:attrNameLst>
+                                          <p:attrName>style.visibility</p:attrName>
+                                        </p:attrNameLst>
+                                      </p:cBhvr>
+                                      <p:to>
+                                        <p:strVal val="visible"/>
+                                      </p:to>
+                                    </p:set>
+                                    <p:animEffect transition="in" filter="fade">
+                                      <p:cBhvr>
+                                        <p:cTn id="7" dur="500"/>
+                                        <p:tgtEl>
+                                          <p:spTgt spid="4101"/>
+                                        </p:tgtEl>
+                                      </p:cBhvr>
+                                    </p:animEffect>
+                                  </p:childTnLst>
+                                </p:cTn>
+                              </p:par>
+                              <p:par>
+                                <p:cTn id="8" presetID="35" presetClass="path" presetSubtype="0" accel="50000" decel="50000" fill="hold" nodeType="withEffect">
+                                  <p:stCondLst>
+                                    <p:cond delay="0"/>
+                                  </p:stCondLst>
+                                  <p:childTnLst>
+                                    <p:animMotion origin="layout" path="M 0.04809 1.11111E-6 L -3.88889E-6 1.11111E-6 " pathEditMode="relative" rAng="0" ptsTypes="AA">
+                                      <p:cBhvr>
+                                        <p:cTn id="9" dur="2000" fill="hold"/>
+                                        <p:tgtEl>
+                                          <p:spTgt spid="4101"/>
+                                        </p:tgtEl>
+                                        <p:attrNameLst>
+                                          <p:attrName>ppt_x</p:attrName>
+                                          <p:attrName>ppt_y</p:attrName>
+                                        </p:attrNameLst>
+                                      </p:cBhvr>
+                                      <p:rCtr x="-2413" y="0"/>
+                                    </p:animMotion>
+                                  </p:childTnLst>
+                                </p:cTn>
+                              </p:par>
+                            </p:childTnLst>
+                          </p:cTn>
+                        </p:par>
+                      </p:childTnLst>
+                    </p:cTn>
+                  </p:par>
+                  <p:par>
+                    <p:cTn id="10" fill="hold">
+                      <p:stCondLst>
+                        <p:cond delay="indefinite"/>
+                      </p:stCondLst>
+                      <p:childTnLst>
+                        <p:par>
+                          <p:cTn id="11" fill="hold">
+                            <p:stCondLst>
+                              <p:cond delay="0"/>
+                            </p:stCondLst>
+                            <p:childTnLst>
+                              <p:par>
+                                <p:cTn id="12" presetID="10" presetClass="exit" presetSubtype="0" fill="hold" nodeType="clickEffect">
+                                  <p:stCondLst>
+                                    <p:cond delay="500"/>
+                                  </p:stCondLst>
+                                  <p:childTnLst>
+                                    <p:animEffect transition="out" filter="fade">
+                                      <p:cBhvr>
+                                        <p:cTn id="13" dur="500"/>
+                                        <p:tgtEl>
+                                          <p:spTgt spid="4101"/>
+                                        </p:tgtEl>
+                                      </p:cBhvr>
+                                    </p:animEffect>
+                                    <p:set>
+                                      <p:cBhvr>
+                                        <p:cTn id="14" dur="1" fill="hold">
+                                          <p:stCondLst>
+                                            <p:cond delay="499"/>
+                                          </p:stCondLst>
+                                        </p:cTn>
+                                        <p:tgtEl>
+                                          <p:spTgt spid="4101"/>
+                                        </p:tgtEl>
+                                        <p:attrNameLst>
+                                          <p:attrName>style.visibility</p:attrName>
+                                        </p:attrNameLst>
+                                      </p:cBhvr>
+                                      <p:to>
+                                        <p:strVal val="hidden"/>
+                                      </p:to>
+                                    </p:set>
+                                  </p:childTnLst>
+                                </p:cTn>
+                              </p:par>
+                              <p:par>
+                                <p:cTn id="15" presetID="35" presetClass="path" presetSubtype="0" accel="50000" decel="50000" fill="hold" nodeType="withEffect">
+                                  <p:stCondLst>
+                                    <p:cond delay="0"/>
+                                  </p:stCondLst>
+                                  <p:childTnLst>
+                                    <p:animMotion origin="layout" path="M -3.88889E-6 1.11111E-6 L -0.04635 1.11111E-6 " pathEditMode="relative" rAng="0" ptsTypes="AA">
+                                      <p:cBhvr>
+                                        <p:cTn id="16" dur="2000" fill="hold"/>
+                                        <p:tgtEl>
+                                          <p:spTgt spid="4101"/>
+                                        </p:tgtEl>
+                                        <p:attrNameLst>
+                                          <p:attrName>ppt_x</p:attrName>
+                                          <p:attrName>ppt_y</p:attrName>
+                                        </p:attrNameLst>
+                                      </p:cBhvr>
+                                      <p:rCtr x="-2326" y="0"/>
+                                    </p:animMotion>
+                                  </p:childTnLst>
+                                </p:cTn>
+                              </p:par>
+                            </p:childTnLst>
+                          </p:cTn>
+                        </p:par>
+                        <p:par>
+                          <p:cTn id="17" fill="hold">
+                            <p:stCondLst>
+                              <p:cond delay="2000"/>
+                            </p:stCondLst>
+                            <p:childTnLst>
+                              <p:par>
+                                <p:cTn id="18" presetID="10" presetClass="entr" presetSubtype="0" fill="hold" nodeType="afterEffect">
+                                  <p:stCondLst>
+                                    <p:cond delay="0"/>
+                                  </p:stCondLst>
+                                  <p:childTnLst>
+                                    <p:set>
+                                      <p:cBhvr>
+                                        <p:cTn id="19" dur="1" fill="hold">
+                                          <p:stCondLst>
+                                            <p:cond delay="0"/>
+                                          </p:stCondLst>
+                                        </p:cTn>
+                                        <p:tgtEl>
+                                          <p:spTgt spid="4104"/>
+                                        </p:tgtEl>
+                                        <p:attrNameLst>
+                                          <p:attrName>style.visibility</p:attrName>
+                                        </p:attrNameLst>
+                                      </p:cBhvr>
+                                      <p:to>
+                                        <p:strVal val="visible"/>
+                                      </p:to>
+                                    </p:set>
+                                    <p:animEffect transition="in" filter="fade">
+                                      <p:cBhvr>
+                                        <p:cTn id="20" dur="500"/>
+                                        <p:tgtEl>
+                                          <p:spTgt spid="4104"/>
+                                        </p:tgtEl>
+                                      </p:cBhvr>
+                                    </p:animEffect>
+                                  </p:childTnLst>
+                                </p:cTn>
+                              </p:par>
+                              <p:par>
+                                <p:cTn id="21" presetID="35" presetClass="path" presetSubtype="0" accel="50000" decel="50000" fill="hold" nodeType="withEffect">
+                                  <p:stCondLst>
+                                    <p:cond delay="0"/>
+                                  </p:stCondLst>
+                                  <p:childTnLst>
+                                    <p:animMotion origin="layout" path="M 0.04809 1.11111E-6 L -3.88889E-6 1.11111E-6 " pathEditMode="relative" rAng="0" ptsTypes="AA">
+                                      <p:cBhvr>
+                                        <p:cTn id="22" dur="2000" fill="hold"/>
+                                        <p:tgtEl>
+                                          <p:spTgt spid="4104"/>
+                                        </p:tgtEl>
+                                        <p:attrNameLst>
+                                          <p:attrName>ppt_x</p:attrName>
+                                          <p:attrName>ppt_y</p:attrName>
+                                        </p:attrNameLst>
+                                      </p:cBhvr>
+                                      <p:rCtr x="-2413" y="0"/>
+                                    </p:animMotion>
+                                  </p:childTnLst>
+                                </p:cTn>
+                              </p:par>
+                            </p:childTnLst>
+                          </p:cTn>
+                        </p:par>
+                      </p:childTnLst>
+                    </p:cTn>
+                  </p:par>
+                  <p:par>
+                    <p:cTn id="23" fill="hold">
+                      <p:stCondLst>
+                        <p:cond delay="indefinite"/>
+                      </p:stCondLst>
+                      <p:childTnLst>
+                        <p:par>
+                          <p:cTn id="24" fill="hold">
+                            <p:stCondLst>
+                              <p:cond delay="0"/>
+                            </p:stCondLst>
+                            <p:childTnLst>
+                              <p:par>
+                                <p:cTn id="25" presetID="10" presetClass="exit" presetSubtype="0" fill="hold" nodeType="clickEffect">
+                                  <p:stCondLst>
+                                    <p:cond delay="500"/>
+                                  </p:stCondLst>
+                                  <p:childTnLst>
+                                    <p:animEffect transition="out" filter="fade">
+                                      <p:cBhvr>
+                                        <p:cTn id="26" dur="500"/>
+                                        <p:tgtEl>
+                                          <p:spTgt spid="4104"/>
+                                        </p:tgtEl>
+                                      </p:cBhvr>
+                                    </p:animEffect>
+                                    <p:set>
+                                      <p:cBhvr>
+                                        <p:cTn id="27" dur="1" fill="hold">
+                                          <p:stCondLst>
+                                            <p:cond delay="499"/>
+                                          </p:stCondLst>
+                                        </p:cTn>
+                                        <p:tgtEl>
+                                          <p:spTgt spid="4104"/>
+                                        </p:tgtEl>
+                                        <p:attrNameLst>
+                                          <p:attrName>style.visibility</p:attrName>
+                                        </p:attrNameLst>
+                                      </p:cBhvr>
+                                      <p:to>
+                                        <p:strVal val="hidden"/>
+                                      </p:to>
+                                    </p:set>
+                                  </p:childTnLst>
+                                </p:cTn>
+                              </p:par>
+                              <p:par>
+                                <p:cTn id="28" presetID="35" presetClass="path" presetSubtype="0" accel="50000" decel="50000" fill="hold" nodeType="withEffect">
+                                  <p:stCondLst>
+                                    <p:cond delay="0"/>
+                                  </p:stCondLst>
+                                  <p:childTnLst>
+                                    <p:animMotion origin="layout" path="M -3.88889E-6 1.11111E-6 L -0.04635 1.11111E-6 " pathEditMode="relative" rAng="0" ptsTypes="AA">
+                                      <p:cBhvr>
+                                        <p:cTn id="29" dur="2000" fill="hold"/>
+                                        <p:tgtEl>
+                                          <p:spTgt spid="4104"/>
+                                        </p:tgtEl>
+                                        <p:attrNameLst>
+                                          <p:attrName>ppt_x</p:attrName>
+                                          <p:attrName>ppt_y</p:attrName>
+                                        </p:attrNameLst>
+                                      </p:cBhvr>
+                                      <p:rCtr x="-2326" y="0"/>
+                                    </p:animMotion>
+                                  </p:childTnLst>
+                                </p:cTn>
+                              </p:par>
+                            </p:childTnLst>
+                          </p:cTn>
+                        </p:par>
+                        <p:par>
+                          <p:cTn id="30" fill="hold">
+                            <p:stCondLst>
+                              <p:cond delay="2000"/>
+                            </p:stCondLst>
+                            <p:childTnLst>
+                              <p:par>
+                                <p:cTn id="31" presetID="10" presetClass="entr" presetSubtype="0" fill="hold" nodeType="afterEffect">
+                                  <p:stCondLst>
+                                    <p:cond delay="0"/>
+                                  </p:stCondLst>
+                                  <p:childTnLst>
+                                    <p:set>
+                                      <p:cBhvr>
+                                        <p:cTn id="32" dur="1" fill="hold">
+                                          <p:stCondLst>
+                                            <p:cond delay="0"/>
+                                          </p:stCondLst>
+                                        </p:cTn>
+                                        <p:tgtEl>
+                                          <p:spTgt spid="4105"/>
+                                        </p:tgtEl>
+                                        <p:attrNameLst>
+                                          <p:attrName>style.visibility</p:attrName>
+                                        </p:attrNameLst>
+                                      </p:cBhvr>
+                                      <p:to>
+                                        <p:strVal val="visible"/>
+                                      </p:to>
+                                    </p:set>
+                                    <p:animEffect transition="in" filter="fade">
+                                      <p:cBhvr>
+                                        <p:cTn id="33" dur="500"/>
+                                        <p:tgtEl>
+                                          <p:spTgt spid="4105"/>
+                                        </p:tgtEl>
+                                      </p:cBhvr>
+                                    </p:animEffect>
+                                  </p:childTnLst>
+                                </p:cTn>
+                              </p:par>
+                              <p:par>
+                                <p:cTn id="34" presetID="35" presetClass="path" presetSubtype="0" accel="50000" decel="50000" fill="hold" nodeType="withEffect">
+                                  <p:stCondLst>
+                                    <p:cond delay="0"/>
+                                  </p:stCondLst>
+                                  <p:childTnLst>
+                                    <p:animMotion origin="layout" path="M 0.04809 1.11111E-6 L -3.88889E-6 1.11111E-6 " pathEditMode="relative" rAng="0" ptsTypes="AA">
+                                      <p:cBhvr>
+                                        <p:cTn id="35" dur="2000" fill="hold"/>
+                                        <p:tgtEl>
+                                          <p:spTgt spid="4105"/>
+                                        </p:tgtEl>
+                                        <p:attrNameLst>
+                                          <p:attrName>ppt_x</p:attrName>
+                                          <p:attrName>ppt_y</p:attrName>
+                                        </p:attrNameLst>
+                                      </p:cBhvr>
+                                      <p:rCtr x="-2413" y="0"/>
+                                    </p:animMotion>
+                                  </p:childTnLst>
+                                </p:cTn>
+                              </p:par>
+                            </p:childTnLst>
+                          </p:cTn>
+                        </p:par>
+                      </p:childTnLst>
+                    </p:cTn>
+                  </p:par>
+                  <p:par>
+                    <p:cTn id="36" fill="hold">
+                      <p:stCondLst>
+                        <p:cond delay="indefinite"/>
+                      </p:stCondLst>
+                      <p:childTnLst>
+                        <p:par>
+                          <p:cTn id="37" fill="hold">
+                            <p:stCondLst>
+                              <p:cond delay="0"/>
+                            </p:stCondLst>
+                            <p:childTnLst>
+                              <p:par>
+                                <p:cTn id="38" presetID="10" presetClass="exit" presetSubtype="0" fill="hold" nodeType="clickEffect">
+                                  <p:stCondLst>
+                                    <p:cond delay="500"/>
+                                  </p:stCondLst>
+                                  <p:childTnLst>
+                                    <p:animEffect transition="out" filter="fade">
+                                      <p:cBhvr>
+                                        <p:cTn id="39" dur="500"/>
+                                        <p:tgtEl>
+                                          <p:spTgt spid="4105"/>
+                                        </p:tgtEl>
+                                      </p:cBhvr>
+                                    </p:animEffect>
+                                    <p:set>
+                                      <p:cBhvr>
+                                        <p:cTn id="40" dur="1" fill="hold">
+                                          <p:stCondLst>
+                                            <p:cond delay="499"/>
+                                          </p:stCondLst>
+                                        </p:cTn>
+                                        <p:tgtEl>
+                                          <p:spTgt spid="4105"/>
+                                        </p:tgtEl>
+                                        <p:attrNameLst>
+                                          <p:attrName>style.visibility</p:attrName>
+                                        </p:attrNameLst>
+                                      </p:cBhvr>
+                                      <p:to>
+                                        <p:strVal val="hidden"/>
+                                      </p:to>
+                                    </p:set>
+                                  </p:childTnLst>
+                                </p:cTn>
+                              </p:par>
+                              <p:par>
+                                <p:cTn id="41" presetID="35" presetClass="path" presetSubtype="0" accel="50000" decel="50000" fill="hold" nodeType="withEffect">
+                                  <p:stCondLst>
+                                    <p:cond delay="0"/>
+                                  </p:stCondLst>
+                                  <p:childTnLst>
+                                    <p:animMotion origin="layout" path="M -3.88889E-6 1.11111E-6 L -0.04635 1.11111E-6 " pathEditMode="relative" rAng="0" ptsTypes="AA">
+                                      <p:cBhvr>
+                                        <p:cTn id="42" dur="2000" fill="hold"/>
+                                        <p:tgtEl>
+                                          <p:spTgt spid="4105"/>
+                                        </p:tgtEl>
+                                        <p:attrNameLst>
+                                          <p:attrName>ppt_x</p:attrName>
+                                          <p:attrName>ppt_y</p:attrName>
+                                        </p:attrNameLst>
+                                      </p:cBhvr>
+                                      <p:rCtr x="-2326" y="0"/>
+                                    </p:animMotion>
+                                  </p:childTnLst>
+                                </p:cTn>
+                              </p:par>
+                            </p:childTnLst>
+                          </p:cTn>
+                        </p:par>
+                        <p:par>
+                          <p:cTn id="43" fill="hold">
+                            <p:stCondLst>
+                              <p:cond delay="2000"/>
+                            </p:stCondLst>
+                            <p:childTnLst>
+                              <p:par>
+                                <p:cTn id="44" presetID="10" presetClass="entr" presetSubtype="0" fill="hold" nodeType="afterEffect">
+                                  <p:stCondLst>
+                                    <p:cond delay="0"/>
+                                  </p:stCondLst>
+                                  <p:childTnLst>
+                                    <p:set>
+                                      <p:cBhvr>
+                                        <p:cTn id="45" dur="1" fill="hold">
+                                          <p:stCondLst>
+                                            <p:cond delay="0"/>
+                                          </p:stCondLst>
+                                        </p:cTn>
+                                        <p:tgtEl>
+                                          <p:spTgt spid="4106"/>
+                                        </p:tgtEl>
+                                        <p:attrNameLst>
+                                          <p:attrName>style.visibility</p:attrName>
+                                        </p:attrNameLst>
+                                      </p:cBhvr>
+                                      <p:to>
+                                        <p:strVal val="visible"/>
+                                      </p:to>
+                                    </p:set>
+                                    <p:animEffect transition="in" filter="fade">
+                                      <p:cBhvr>
+                                        <p:cTn id="46" dur="500"/>
+                                        <p:tgtEl>
+                                          <p:spTgt spid="4106"/>
+                                        </p:tgtEl>
+                                      </p:cBhvr>
+                                    </p:animEffect>
+                                  </p:childTnLst>
+                                </p:cTn>
+                              </p:par>
+                              <p:par>
+                                <p:cTn id="47" presetID="35" presetClass="path" presetSubtype="0" accel="50000" decel="50000" fill="hold" nodeType="withEffect">
+                                  <p:stCondLst>
+                                    <p:cond delay="0"/>
+                                  </p:stCondLst>
+                                  <p:childTnLst>
+                                    <p:animMotion origin="layout" path="M 0.04809 1.11111E-6 L -3.88889E-6 1.11111E-6 " pathEditMode="relative" rAng="0" ptsTypes="AA">
+                                      <p:cBhvr>
+                                        <p:cTn id="48" dur="2000" fill="hold"/>
+                                        <p:tgtEl>
+                                          <p:spTgt spid="4106"/>
+                                        </p:tgtEl>
+                                        <p:attrNameLst>
+                                          <p:attrName>ppt_x</p:attrName>
+                                          <p:attrName>ppt_y</p:attrName>
+                                        </p:attrNameLst>
+                                      </p:cBhvr>
+                                      <p:rCtr x="-2413" y="0"/>
+                                    </p:animMotion>
+                                  </p:childTnLst>
+                                </p:cTn>
+                              </p:par>
+                            </p:childTnLst>
+                          </p:cTn>
+                        </p:par>
+                      </p:childTnLst>
+                    </p:cTn>
+                  </p:par>
+                  <p:par>
+                    <p:cTn id="49" fill="hold">
+                      <p:stCondLst>
+                        <p:cond delay="indefinite"/>
+                      </p:stCondLst>
+                      <p:childTnLst>
+                        <p:par>
+                          <p:cTn id="50" fill="hold">
+                            <p:stCondLst>
+                              <p:cond delay="0"/>
+                            </p:stCondLst>
+                            <p:childTnLst>
+                              <p:par>
+                                <p:cTn id="51" presetID="10" presetClass="exit" presetSubtype="0" fill="hold" nodeType="clickEffect">
+                                  <p:stCondLst>
+                                    <p:cond delay="500"/>
+                                  </p:stCondLst>
+                                  <p:childTnLst>
+                                    <p:animEffect transition="out" filter="fade">
+                                      <p:cBhvr>
+                                        <p:cTn id="52" dur="500"/>
+                                        <p:tgtEl>
+                                          <p:spTgt spid="4106"/>
+                                        </p:tgtEl>
+                                      </p:cBhvr>
+                                    </p:animEffect>
+                                    <p:set>
+                                      <p:cBhvr>
+                                        <p:cTn id="53" dur="1" fill="hold">
+                                          <p:stCondLst>
+                                            <p:cond delay="499"/>
+                                          </p:stCondLst>
+                                        </p:cTn>
+                                        <p:tgtEl>
+                                          <p:spTgt spid="4106"/>
+                                        </p:tgtEl>
+                                        <p:attrNameLst>
+                                          <p:attrName>style.visibility</p:attrName>
+                                        </p:attrNameLst>
+                                      </p:cBhvr>
+                                      <p:to>
+                                        <p:strVal val="hidden"/>
+                                      </p:to>
+                                    </p:set>
+                                  </p:childTnLst>
+                                </p:cTn>
+                              </p:par>
+                              <p:par>
+                                <p:cTn id="54" presetID="35" presetClass="path" presetSubtype="0" accel="50000" decel="50000" fill="hold" nodeType="withEffect">
+                                  <p:stCondLst>
+                                    <p:cond delay="0"/>
+                                  </p:stCondLst>
+                                  <p:childTnLst>
+                                    <p:animMotion origin="layout" path="M -3.88889E-6 1.11111E-6 L -0.04635 1.11111E-6 " pathEditMode="relative" rAng="0" ptsTypes="AA">
+                                      <p:cBhvr>
+                                        <p:cTn id="55" dur="2000" fill="hold"/>
+                                        <p:tgtEl>
+                                          <p:spTgt spid="4106"/>
+                                        </p:tgtEl>
+                                        <p:attrNameLst>
+                                          <p:attrName>ppt_x</p:attrName>
+                                          <p:attrName>ppt_y</p:attrName>
+                                        </p:attrNameLst>
+                                      </p:cBhvr>
+                                      <p:rCtr x="-2326" y="0"/>
+                                    </p:animMotion>
+                                  </p:childTnLst>
+                                </p:cTn>
+                              </p:par>
+                            </p:childTnLst>
+                          </p:cTn>
+                        </p:par>
+                        <p:par>
+                          <p:cTn id="56" fill="hold">
+                            <p:stCondLst>
+                              <p:cond delay="2000"/>
+                            </p:stCondLst>
+                            <p:childTnLst>
+                              <p:par>
+                                <p:cTn id="57" presetID="10" presetClass="entr" presetSubtype="0" fill="hold" nodeType="afterEffect">
+                                  <p:stCondLst>
+                                    <p:cond delay="0"/>
+                                  </p:stCondLst>
+                                  <p:childTnLst>
+                                    <p:set>
+                                      <p:cBhvr>
+                                        <p:cTn id="58" dur="1" fill="hold">
+                                          <p:stCondLst>
+                                            <p:cond delay="0"/>
+                                          </p:stCondLst>
+                                        </p:cTn>
+                                        <p:tgtEl>
+                                          <p:spTgt spid="4107"/>
+                                        </p:tgtEl>
+                                        <p:attrNameLst>
+                                          <p:attrName>style.visibility</p:attrName>
+                                        </p:attrNameLst>
+                                      </p:cBhvr>
+                                      <p:to>
+                                        <p:strVal val="visible"/>
+                                      </p:to>
+                                    </p:set>
+                                    <p:animEffect transition="in" filter="fade">
+                                      <p:cBhvr>
+                                        <p:cTn id="59" dur="500"/>
+                                        <p:tgtEl>
+                                          <p:spTgt spid="4107"/>
+                                        </p:tgtEl>
+                                      </p:cBhvr>
+                                    </p:animEffect>
+                                  </p:childTnLst>
+                                </p:cTn>
+                              </p:par>
+                              <p:par>
+                                <p:cTn id="60" presetID="35" presetClass="path" presetSubtype="0" accel="50000" decel="50000" fill="hold" nodeType="withEffect">
+                                  <p:stCondLst>
+                                    <p:cond delay="0"/>
+                                  </p:stCondLst>
+                                  <p:childTnLst>
+                                    <p:animMotion origin="layout" path="M 0.04809 1.11111E-6 L -3.88889E-6 1.11111E-6 " pathEditMode="relative" rAng="0" ptsTypes="AA">
+                                      <p:cBhvr>
+                                        <p:cTn id="61" dur="2000" fill="hold"/>
+                                        <p:tgtEl>
+                                          <p:spTgt spid="4107"/>
+                                        </p:tgtEl>
+                                        <p:attrNameLst>
+                                          <p:attrName>ppt_x</p:attrName>
+                                          <p:attrName>ppt_y</p:attrName>
+                                        </p:attrNameLst>
+                                      </p:cBhvr>
+                                      <p:rCtr x="-2413" y="0"/>
+                                    </p:animMotion>
+                                  </p:childTnLst>
+                                </p:cTn>
+                              </p:par>
+                            </p:childTnLst>
+                          </p:cTn>
+                        </p:par>
+                      </p:childTnLst>
+                    </p:cTn>
+                  </p:par>
+                  <p:par>
+                    <p:cTn id="62" fill="hold">
+                      <p:stCondLst>
+                        <p:cond delay="indefinite"/>
+                      </p:stCondLst>
+                      <p:childTnLst>
+                        <p:par>
+                          <p:cTn id="63" fill="hold">
+                            <p:stCondLst>
+                              <p:cond delay="0"/>
+                            </p:stCondLst>
+                            <p:childTnLst>
+                              <p:par>
+                                <p:cTn id="64" presetID="10" presetClass="exit" presetSubtype="0" fill="hold" nodeType="clickEffect">
+                                  <p:stCondLst>
+                                    <p:cond delay="500"/>
+                                  </p:stCondLst>
+                                  <p:childTnLst>
+                                    <p:animEffect transition="out" filter="fade">
+                                      <p:cBhvr>
+                                        <p:cTn id="65" dur="500"/>
+                                        <p:tgtEl>
+                                          <p:spTgt spid="4107"/>
+                                        </p:tgtEl>
+                                      </p:cBhvr>
+                                    </p:animEffect>
+                                    <p:set>
+                                      <p:cBhvr>
+                                        <p:cTn id="66" dur="1" fill="hold">
+                                          <p:stCondLst>
+                                            <p:cond delay="499"/>
+                                          </p:stCondLst>
+                                        </p:cTn>
+                                        <p:tgtEl>
+                                          <p:spTgt spid="4107"/>
+                                        </p:tgtEl>
+                                        <p:attrNameLst>
+                                          <p:attrName>style.visibility</p:attrName>
+                                        </p:attrNameLst>
+                                      </p:cBhvr>
+                                      <p:to>
+                                        <p:strVal val="hidden"/>
+                                      </p:to>
+                                    </p:set>
+                                  </p:childTnLst>
+                                </p:cTn>
+                              </p:par>
+                              <p:par>
+                                <p:cTn id="67" presetID="35" presetClass="path" presetSubtype="0" accel="50000" decel="50000" fill="hold" nodeType="withEffect">
+                                  <p:stCondLst>
+                                    <p:cond delay="0"/>
+                                  </p:stCondLst>
+                                  <p:childTnLst>
+                                    <p:animMotion origin="layout" path="M -3.88889E-6 1.11111E-6 L -0.04635 1.11111E-6 " pathEditMode="relative" rAng="0" ptsTypes="AA">
+                                      <p:cBhvr>
+                                        <p:cTn id="68" dur="2000" fill="hold"/>
+                                        <p:tgtEl>
+                                          <p:spTgt spid="4107"/>
+                                        </p:tgtEl>
+                                        <p:attrNameLst>
+                                          <p:attrName>ppt_x</p:attrName>
+                                          <p:attrName>ppt_y</p:attrName>
+                                        </p:attrNameLst>
+                                      </p:cBhvr>
+                                      <p:rCtr x="-2326" y="0"/>
+                                    </p:animMotion>
+                                  </p:childTnLst>
+                                </p:cTn>
+                              </p:par>
+                            </p:childTnLst>
+                          </p:cTn>
+                        </p:par>
+                        <p:par>
+                          <p:cTn id="69" fill="hold">
+                            <p:stCondLst>
+                              <p:cond delay="2000"/>
+                            </p:stCondLst>
+                            <p:childTnLst>
+                              <p:par>
+                                <p:cTn id="70" presetID="10" presetClass="entr" presetSubtype="0" fill="hold" nodeType="afterEffect">
+                                  <p:stCondLst>
+                                    <p:cond delay="0"/>
+                                  </p:stCondLst>
+                                  <p:childTnLst>
+                                    <p:set>
+                                      <p:cBhvr>
+                                        <p:cTn id="71" dur="1" fill="hold">
+                                          <p:stCondLst>
+                                            <p:cond delay="0"/>
+                                          </p:stCondLst>
+                                        </p:cTn>
+                                        <p:tgtEl>
+                                          <p:spTgt spid="4109"/>
+                                        </p:tgtEl>
+                                        <p:attrNameLst>
+                                          <p:attrName>style.visibility</p:attrName>
+                                        </p:attrNameLst>
+                                      </p:cBhvr>
+                                      <p:to>
+                                        <p:strVal val="visible"/>
+                                      </p:to>
+                                    </p:set>
+                                    <p:animEffect transition="in" filter="fade">
+                                      <p:cBhvr>
+                                        <p:cTn id="72" dur="500"/>
+                                        <p:tgtEl>
+                                          <p:spTgt spid="4109"/>
+                                        </p:tgtEl>
+                                      </p:cBhvr>
+                                    </p:animEffect>
+                                  </p:childTnLst>
+                                </p:cTn>
+                              </p:par>
+                              <p:par>
+                                <p:cTn id="73" presetID="35" presetClass="path" presetSubtype="0" accel="50000" decel="50000" fill="hold" nodeType="withEffect">
+                                  <p:stCondLst>
+                                    <p:cond delay="0"/>
+                                  </p:stCondLst>
+                                  <p:childTnLst>
+                                    <p:animMotion origin="layout" path="M 0.04809 1.11111E-6 L -3.88889E-6 1.11111E-6 " pathEditMode="relative" rAng="0" ptsTypes="AA">
+                                      <p:cBhvr>
+                                        <p:cTn id="74" dur="2000" fill="hold"/>
+                                        <p:tgtEl>
+                                          <p:spTgt spid="4109"/>
+                                        </p:tgtEl>
+                                        <p:attrNameLst>
+                                          <p:attrName>ppt_x</p:attrName>
+                                          <p:attrName>ppt_y</p:attrName>
+                                        </p:attrNameLst>
+                                      </p:cBhvr>
+                                      <p:rCtr x="-2413" y="0"/>
+                                    </p:animMotion>
+                                  </p:childTnLst>
+                                </p:cTn>
+                              </p:par>
+                            </p:childTnLst>
+                          </p:cTn>
+                        </p:par>
+                      </p:childTnLst>
+                    </p:cTn>
+                  </p:par>
+                  <p:par>
+                    <p:cTn id="75" fill="hold">
+                      <p:stCondLst>
+                        <p:cond delay="indefinite"/>
+                      </p:stCondLst>
+                      <p:childTnLst>
+                        <p:par>
+                          <p:cTn id="76" fill="hold">
+                            <p:stCondLst>
+                              <p:cond delay="0"/>
+                            </p:stCondLst>
+                            <p:childTnLst>
+                              <p:par>
+                                <p:cTn id="77" presetID="10" presetClass="exit" presetSubtype="0" fill="hold" nodeType="clickEffect">
+                                  <p:stCondLst>
+                                    <p:cond delay="500"/>
+                                  </p:stCondLst>
+                                  <p:childTnLst>
+                                    <p:animEffect transition="out" filter="fade">
+                                      <p:cBhvr>
+                                        <p:cTn id="78" dur="500"/>
+                                        <p:tgtEl>
+                                          <p:spTgt spid="4109"/>
+                                        </p:tgtEl>
+                                      </p:cBhvr>
+                                    </p:animEffect>
+                                    <p:set>
+                                      <p:cBhvr>
+                                        <p:cTn id="79" dur="1" fill="hold">
+                                          <p:stCondLst>
+                                            <p:cond delay="499"/>
+                                          </p:stCondLst>
+                                        </p:cTn>
+                                        <p:tgtEl>
+                                          <p:spTgt spid="4109"/>
+                                        </p:tgtEl>
+                                        <p:attrNameLst>
+                                          <p:attrName>style.visibility</p:attrName>
+                                        </p:attrNameLst>
+                                      </p:cBhvr>
+                                      <p:to>
+                                        <p:strVal val="hidden"/>
+                                      </p:to>
+                                    </p:set>
+                                  </p:childTnLst>
+                                </p:cTn>
+                              </p:par>
+                              <p:par>
+                                <p:cTn id="80" presetID="35" presetClass="path" presetSubtype="0" accel="50000" decel="50000" fill="hold" nodeType="withEffect">
+                                  <p:stCondLst>
+                                    <p:cond delay="0"/>
+                                  </p:stCondLst>
+                                  <p:childTnLst>
+                                    <p:animMotion origin="layout" path="M -3.88889E-6 1.11111E-6 L -0.04635 1.11111E-6 " pathEditMode="relative" rAng="0" ptsTypes="AA">
+                                      <p:cBhvr>
+                                        <p:cTn id="81" dur="2000" fill="hold"/>
+                                        <p:tgtEl>
+                                          <p:spTgt spid="4109"/>
+                                        </p:tgtEl>
+                                        <p:attrNameLst>
+                                          <p:attrName>ppt_x</p:attrName>
+                                          <p:attrName>ppt_y</p:attrName>
+                                        </p:attrNameLst>
+                                      </p:cBhvr>
+                                      <p:rCtr x="-2326" y="0"/>
+                                    </p:animMotion>
+                                  </p:childTnLst>
+                                </p:cTn>
+                              </p:par>
+                            </p:childTnLst>
+                          </p:cTn>
+                        </p:par>
+                      </p:childTnLst>
+                    </p:cTn>
+                  </p:par>
+                </p:childTnLst>
+              </p:cTn>
+              <p:prevCondLst>
+                <p:cond evt="onPrev" delay="0">
+                  <p:tgtEl>
+                    <p:sldTgt/>
+                  </p:tgtEl>
+                </p:cond>
+              </p:prevCondLst>
+              <p:nextCondLst>
+                <p:cond evt="onNext" delay="0">
+                  <p:tgtEl>
+                    <p:sldTgt/>
+                  </p:tgtEl>
+                </p:cond>
+              </p:nextCondLst>
+            </p:seq>
+          </p:childTnLst>
+        </p:cTn>
       </p:par>
     </p:tnLst>
   </p:timing>

</xml_diff>

<commit_message>
Finished moving code to coderun
</commit_message>
<xml_diff>
--- a/Programming Made Easy.pptx
+++ b/Programming Made Easy.pptx
@@ -3743,7 +3743,7 @@
           <a:p>
             <a:fld id="{9D3FBBFE-677F-4CC0-BF92-950C0F009223}" type="datetimeFigureOut">
               <a:rPr lang="en-CA" smtClean="0"/>
-              <a:t>10/10/2012</a:t>
+              <a:t>11/10/2012</a:t>
             </a:fld>
             <a:endParaRPr lang="en-CA"/>
           </a:p>
@@ -4450,14 +4450,16 @@
           <a:lstStyle/>
           <a:p>
             <a:r>
-              <a:rPr lang="pl-PL" dirty="0" smtClean="0"/>
-              <a:t>15 no wifi</a:t>
-            </a:r>
-          </a:p>
-          <a:p>
-            <a:r>
-              <a:rPr lang="pl-PL" dirty="0" smtClean="0"/>
-              <a:t>16 wifi</a:t>
+              <a:rPr lang="en-CA" sz="1200" b="1" i="0" kern="1200" dirty="0" err="1" smtClean="0">
+                <a:solidFill>
+                  <a:schemeClr val="tx1"/>
+                </a:solidFill>
+                <a:effectLst/>
+                <a:latin typeface="+mn-lt"/>
+                <a:ea typeface="+mn-ea"/>
+                <a:cs typeface="+mn-cs"/>
+              </a:rPr>
+              <a:t>webmusespresenter</a:t>
             </a:r>
             <a:endParaRPr lang="en-CA" dirty="0"/>
           </a:p>
@@ -4480,7 +4482,7 @@
           <a:p>
             <a:fld id="{F036235D-DA40-4917-9347-5AA27D26558A}" type="slidenum">
               <a:rPr lang="en-CA" smtClean="0"/>
-              <a:t>28</a:t>
+              <a:t>19</a:t>
             </a:fld>
             <a:endParaRPr lang="en-CA"/>
           </a:p>
@@ -4489,7 +4491,7 @@
     </p:spTree>
     <p:extLst>
       <p:ext uri="{BB962C8B-B14F-4D97-AF65-F5344CB8AC3E}">
-        <p14:creationId xmlns:p14="http://schemas.microsoft.com/office/powerpoint/2010/main" val="2681861613"/>
+        <p14:creationId xmlns:p14="http://schemas.microsoft.com/office/powerpoint/2010/main" val="1915565334"/>
       </p:ext>
     </p:extLst>
   </p:cSld>
@@ -4545,6 +4547,100 @@
           <a:p>
             <a:r>
               <a:rPr lang="pl-PL" dirty="0" smtClean="0"/>
+              <a:t>15 no wifi</a:t>
+            </a:r>
+          </a:p>
+          <a:p>
+            <a:r>
+              <a:rPr lang="pl-PL" dirty="0" smtClean="0"/>
+              <a:t>16 wifi</a:t>
+            </a:r>
+            <a:endParaRPr lang="en-CA" dirty="0"/>
+          </a:p>
+        </p:txBody>
+      </p:sp>
+      <p:sp>
+        <p:nvSpPr>
+          <p:cNvPr id="4" name="Slide Number Placeholder 3"/>
+          <p:cNvSpPr>
+            <a:spLocks noGrp="1"/>
+          </p:cNvSpPr>
+          <p:nvPr>
+            <p:ph type="sldNum" sz="quarter" idx="10"/>
+          </p:nvPr>
+        </p:nvSpPr>
+        <p:spPr/>
+        <p:txBody>
+          <a:bodyPr/>
+          <a:lstStyle/>
+          <a:p>
+            <a:fld id="{F036235D-DA40-4917-9347-5AA27D26558A}" type="slidenum">
+              <a:rPr lang="en-CA" smtClean="0"/>
+              <a:t>28</a:t>
+            </a:fld>
+            <a:endParaRPr lang="en-CA"/>
+          </a:p>
+        </p:txBody>
+      </p:sp>
+    </p:spTree>
+    <p:extLst>
+      <p:ext uri="{BB962C8B-B14F-4D97-AF65-F5344CB8AC3E}">
+        <p14:creationId xmlns:p14="http://schemas.microsoft.com/office/powerpoint/2010/main" val="2681861613"/>
+      </p:ext>
+    </p:extLst>
+  </p:cSld>
+  <p:clrMapOvr>
+    <a:masterClrMapping/>
+  </p:clrMapOvr>
+</p:notes>
+</file>
+
+<file path=ppt/notesSlides/notesSlide7.xml><?xml version="1.0" encoding="utf-8"?>
+<p:notes xmlns:a="http://schemas.openxmlformats.org/drawingml/2006/main" xmlns:r="http://schemas.openxmlformats.org/officeDocument/2006/relationships" xmlns:p="http://schemas.openxmlformats.org/presentationml/2006/main">
+  <p:cSld>
+    <p:spTree>
+      <p:nvGrpSpPr>
+        <p:cNvPr id="1" name=""/>
+        <p:cNvGrpSpPr/>
+        <p:nvPr/>
+      </p:nvGrpSpPr>
+      <p:grpSpPr>
+        <a:xfrm>
+          <a:off x="0" y="0"/>
+          <a:ext cx="0" cy="0"/>
+          <a:chOff x="0" y="0"/>
+          <a:chExt cx="0" cy="0"/>
+        </a:xfrm>
+      </p:grpSpPr>
+      <p:sp>
+        <p:nvSpPr>
+          <p:cNvPr id="2" name="Slide Image Placeholder 1"/>
+          <p:cNvSpPr>
+            <a:spLocks noGrp="1" noRot="1" noChangeAspect="1"/>
+          </p:cNvSpPr>
+          <p:nvPr>
+            <p:ph type="sldImg"/>
+          </p:nvPr>
+        </p:nvSpPr>
+        <p:spPr/>
+      </p:sp>
+      <p:sp>
+        <p:nvSpPr>
+          <p:cNvPr id="3" name="Notes Placeholder 2"/>
+          <p:cNvSpPr>
+            <a:spLocks noGrp="1"/>
+          </p:cNvSpPr>
+          <p:nvPr>
+            <p:ph type="body" idx="1"/>
+          </p:nvPr>
+        </p:nvSpPr>
+        <p:spPr/>
+        <p:txBody>
+          <a:bodyPr/>
+          <a:lstStyle/>
+          <a:p>
+            <a:r>
+              <a:rPr lang="pl-PL" dirty="0" smtClean="0"/>
               <a:t>#10 big</a:t>
             </a:r>
             <a:r>
@@ -4597,7 +4693,7 @@
 </p:notes>
 </file>
 
-<file path=ppt/notesSlides/notesSlide7.xml><?xml version="1.0" encoding="utf-8"?>
+<file path=ppt/notesSlides/notesSlide8.xml><?xml version="1.0" encoding="utf-8"?>
 <p:notes xmlns:a="http://schemas.openxmlformats.org/drawingml/2006/main" xmlns:r="http://schemas.openxmlformats.org/officeDocument/2006/relationships" xmlns:p="http://schemas.openxmlformats.org/presentationml/2006/main">
   <p:cSld>
     <p:spTree>
@@ -10461,7 +10557,7 @@
           <a:p>
             <a:fld id="{450045EB-F0A2-405F-866B-BCD425706225}" type="datetimeFigureOut">
               <a:rPr lang="en-CA" smtClean="0"/>
-              <a:t>10/10/2012</a:t>
+              <a:t>11/10/2012</a:t>
             </a:fld>
             <a:endParaRPr lang="en-CA"/>
           </a:p>
@@ -16803,15 +16899,7 @@
           <a:p>
             <a:r>
               <a:rPr lang="pl-PL" dirty="0" smtClean="0"/>
-              <a:t>Task </a:t>
-            </a:r>
-            <a:r>
-              <a:rPr lang="pl-PL" dirty="0" smtClean="0"/>
-              <a:t>0 </a:t>
-            </a:r>
-            <a:r>
-              <a:rPr lang="pl-PL" dirty="0" smtClean="0"/>
-              <a:t>– change a header</a:t>
+              <a:t>Task 0 – change a header</a:t>
             </a:r>
             <a:endParaRPr lang="en-CA" dirty="0"/>
           </a:p>
@@ -17037,15 +17125,7 @@
           <a:p>
             <a:r>
               <a:rPr lang="pl-PL" dirty="0" smtClean="0"/>
-              <a:t>Task </a:t>
-            </a:r>
-            <a:r>
-              <a:rPr lang="pl-PL" dirty="0" smtClean="0"/>
-              <a:t>0.1 </a:t>
-            </a:r>
-            <a:r>
-              <a:rPr lang="pl-PL" dirty="0" smtClean="0"/>
-              <a:t>– prepare a text control</a:t>
+              <a:t>Task 0.1 – prepare a text control</a:t>
             </a:r>
             <a:endParaRPr lang="en-CA" dirty="0"/>
           </a:p>
@@ -17071,11 +17151,7 @@
           <a:p>
             <a:r>
               <a:rPr lang="pl-PL" dirty="0" smtClean="0"/>
-              <a:t>Open </a:t>
-            </a:r>
-            <a:r>
-              <a:rPr lang="pl-PL" dirty="0" smtClean="0"/>
-              <a:t>Index.aspx</a:t>
+              <a:t>Open Index.aspx</a:t>
             </a:r>
             <a:endParaRPr lang="en-CA" dirty="0"/>
           </a:p>
@@ -17103,7 +17179,6 @@
               <a:rPr lang="en-CA" sz="2800" dirty="0"/>
               <a:t>&lt;%= ViewData["Text"] %&gt;</a:t>
             </a:r>
-            <a:endParaRPr lang="en-CA" sz="2800" dirty="0"/>
           </a:p>
         </p:txBody>
       </p:sp>
@@ -17166,7 +17241,6 @@
               <a:rPr lang="en-CA" sz="2800" dirty="0"/>
               <a:t>["Text"]</a:t>
             </a:r>
-            <a:endParaRPr lang="en-CA" sz="2800" dirty="0"/>
           </a:p>
         </p:txBody>
       </p:sp>
@@ -17322,7 +17396,6 @@
               <a:rPr lang="pl-PL" sz="2000" dirty="0" smtClean="0"/>
               <a:t>Surround </a:t>
             </a:r>
-            <a:endParaRPr lang="pl-PL" sz="2000" dirty="0" smtClean="0"/>
           </a:p>
           <a:p>
             <a:r>
@@ -17341,11 +17414,7 @@
           <a:p>
             <a:r>
               <a:rPr lang="pl-PL" sz="2000" dirty="0" smtClean="0"/>
-              <a:t>with </a:t>
-            </a:r>
-            <a:r>
-              <a:rPr lang="pl-PL" sz="2000" dirty="0" smtClean="0"/>
-              <a:t>a &lt;div&gt; with an id</a:t>
+              <a:t>with a &lt;div&gt; with an id</a:t>
             </a:r>
             <a:endParaRPr lang="en-CA" sz="2000" dirty="0"/>
           </a:p>
@@ -17397,11 +17466,7 @@
           <a:p>
             <a:r>
               <a:rPr lang="pl-PL" sz="2800" dirty="0" smtClean="0"/>
-              <a:t>Add a </a:t>
-            </a:r>
-            <a:r>
-              <a:rPr lang="pl-PL" sz="2800" dirty="0" smtClean="0"/>
-              <a:t>border</a:t>
+              <a:t>Add a border</a:t>
             </a:r>
             <a:endParaRPr lang="en-CA" sz="2800" dirty="0"/>
           </a:p>
@@ -17651,11 +17716,7 @@
           <a:p>
             <a:r>
               <a:rPr lang="en-CA" sz="2000" dirty="0"/>
-              <a:t>using System.Xml</a:t>
-            </a:r>
-            <a:r>
-              <a:rPr lang="en-CA" sz="2000" dirty="0"/>
-              <a:t>;</a:t>
+              <a:t>using System.Xml;</a:t>
             </a:r>
             <a:br>
               <a:rPr lang="en-CA" sz="2000" dirty="0"/>
@@ -17666,11 +17727,7 @@
             </a:r>
             <a:r>
               <a:rPr lang="en-CA" sz="2000" dirty="0"/>
-              <a:t>System.Globalization</a:t>
-            </a:r>
-            <a:r>
-              <a:rPr lang="en-CA" sz="2000" dirty="0"/>
-              <a:t>;</a:t>
+              <a:t>System.Globalization;</a:t>
             </a:r>
             <a:br>
               <a:rPr lang="en-CA" sz="2000" dirty="0"/>
@@ -20583,7 +20640,7 @@
         </p:blipFill>
         <p:spPr bwMode="auto">
           <a:xfrm>
-            <a:off x="323528" y="4869160"/>
+            <a:off x="323528" y="4941168"/>
             <a:ext cx="8691693" cy="1123181"/>
           </a:xfrm>
           <a:prstGeom prst="rect">
@@ -20841,35 +20898,35 @@
           <a:lstStyle/>
           <a:p>
             <a:r>
-              <a:rPr lang="pl-PL" sz="2800" dirty="0" smtClean="0"/>
+              <a:rPr lang="pl-PL" sz="2400" dirty="0" smtClean="0"/>
               <a:t>Search for NY: </a:t>
             </a:r>
             <a:r>
-              <a:rPr lang="el-GR" sz="2800" dirty="0" smtClean="0">
+              <a:rPr lang="el-GR" sz="2400" dirty="0" smtClean="0">
                 <a:cs typeface="Times New Roman"/>
               </a:rPr>
               <a:t>φ</a:t>
             </a:r>
             <a:r>
-              <a:rPr lang="pl-PL" sz="2800" dirty="0" smtClean="0">
+              <a:rPr lang="pl-PL" sz="2400" dirty="0" smtClean="0">
                 <a:cs typeface="Times New Roman"/>
               </a:rPr>
               <a:t>=40.75, </a:t>
             </a:r>
             <a:r>
-              <a:rPr lang="el-GR" sz="2800" dirty="0" smtClean="0">
+              <a:rPr lang="el-GR" sz="2400" dirty="0" smtClean="0">
                 <a:cs typeface="Times New Roman"/>
               </a:rPr>
               <a:t>λ</a:t>
             </a:r>
             <a:r>
-              <a:rPr lang="pl-PL" sz="2800" dirty="0" smtClean="0">
+              <a:rPr lang="pl-PL" sz="2400" dirty="0" smtClean="0">
                 <a:cs typeface="Times New Roman"/>
               </a:rPr>
               <a:t>=</a:t>
             </a:r>
             <a:r>
-              <a:rPr lang="pl-PL" sz="2800" dirty="0" smtClean="0">
+              <a:rPr lang="pl-PL" sz="2400" dirty="0" smtClean="0">
                 <a:ea typeface="Segoe UI"/>
                 <a:cs typeface="Segoe UI"/>
               </a:rPr>
@@ -20878,17 +20935,17 @@
           </a:p>
           <a:p>
             <a:r>
-              <a:rPr lang="pl-PL" sz="2800" dirty="0" smtClean="0">
+              <a:rPr lang="pl-PL" sz="2400" dirty="0" smtClean="0">
                 <a:ea typeface="Segoe UI"/>
                 <a:cs typeface="Segoe UI"/>
               </a:rPr>
               <a:t>r=1 [km]</a:t>
             </a:r>
             <a:r>
-              <a:rPr lang="pl-PL" sz="2800" dirty="0" smtClean="0"/>
+              <a:rPr lang="pl-PL" sz="2400" dirty="0" smtClean="0"/>
               <a:t> </a:t>
             </a:r>
-            <a:endParaRPr lang="en-CA" sz="2800" dirty="0"/>
+            <a:endParaRPr lang="en-CA" sz="2400" dirty="0"/>
           </a:p>
         </p:txBody>
       </p:sp>
@@ -21015,7 +21072,7 @@
         </p:blipFill>
         <p:spPr bwMode="auto">
           <a:xfrm>
-            <a:off x="323527" y="4293096"/>
+            <a:off x="333131" y="4293096"/>
             <a:ext cx="7586137" cy="1752972"/>
           </a:xfrm>
           <a:prstGeom prst="rect">
@@ -21408,7 +21465,7 @@
         </p:blipFill>
         <p:spPr bwMode="auto">
           <a:xfrm>
-            <a:off x="323527" y="4221088"/>
+            <a:off x="354547" y="4221088"/>
             <a:ext cx="7904679" cy="1781547"/>
           </a:xfrm>
           <a:prstGeom prst="rect">
@@ -22177,13 +22234,10 @@
           <a:lstStyle/>
           <a:p>
             <a:r>
-              <a:rPr lang="pl-PL" sz="2400" dirty="0" smtClean="0"/>
-              <a:t>Change in the view: </a:t>
+              <a:rPr lang="pl-PL" dirty="0"/>
+              <a:t>Iterate through the shops</a:t>
             </a:r>
-            <a:r>
-              <a:rPr lang="en-CA" sz="2000" dirty="0"/>
-              <a:t>@Html.Raw(ViewBag.Text)</a:t>
-            </a:r>
+            <a:endParaRPr lang="en-CA" dirty="0"/>
           </a:p>
         </p:txBody>
       </p:sp>
@@ -22206,10 +22260,10 @@
           <a:lstStyle/>
           <a:p>
             <a:r>
-              <a:rPr lang="pl-PL" dirty="0" smtClean="0"/>
-              <a:t>Iterate through the shops</a:t>
+              <a:rPr lang="pl-PL" sz="2400" dirty="0"/>
+              <a:t>Foreach – goes through every member of a collection</a:t>
             </a:r>
-            <a:endParaRPr lang="en-CA" dirty="0"/>
+            <a:endParaRPr lang="en-CA" sz="2400" dirty="0"/>
           </a:p>
         </p:txBody>
       </p:sp>
@@ -22232,10 +22286,10 @@
           <a:lstStyle/>
           <a:p>
             <a:r>
-              <a:rPr lang="pl-PL" sz="2200" dirty="0" smtClean="0"/>
-              <a:t>Foreach – goes through every member of a collection</a:t>
+              <a:rPr lang="pl-PL" dirty="0"/>
+              <a:t>Construct HTML’s table</a:t>
             </a:r>
-            <a:endParaRPr lang="en-CA" sz="2200" dirty="0"/>
+            <a:endParaRPr lang="en-CA" dirty="0"/>
           </a:p>
         </p:txBody>
       </p:sp>
@@ -22257,10 +22311,6 @@
           <a:bodyPr/>
           <a:lstStyle/>
           <a:p>
-            <a:r>
-              <a:rPr lang="pl-PL" sz="2800" dirty="0" smtClean="0"/>
-              <a:t>Use &lt;table&gt;, &lt;tr&gt;, &lt;th&gt; and &lt;td&gt;</a:t>
-            </a:r>
             <a:endParaRPr lang="en-CA" sz="2800" dirty="0"/>
           </a:p>
         </p:txBody>
@@ -22306,16 +22356,16 @@
           <a:lstStyle/>
           <a:p>
             <a:r>
-              <a:rPr lang="pl-PL" dirty="0" smtClean="0"/>
-              <a:t>Construct HTML’s table</a:t>
+              <a:rPr lang="pl-PL" sz="2800" dirty="0"/>
+              <a:t>Use &lt;table&gt;, &lt;tr&gt;, &lt;th&gt; and &lt;td&gt;</a:t>
             </a:r>
-            <a:endParaRPr lang="en-CA" dirty="0"/>
+            <a:endParaRPr lang="en-CA" sz="2800" dirty="0"/>
           </a:p>
         </p:txBody>
       </p:sp>
       <p:pic>
         <p:nvPicPr>
-          <p:cNvPr id="10242" name="Picture 2"/>
+          <p:cNvPr id="10243" name="Picture 3"/>
           <p:cNvPicPr>
             <a:picLocks noChangeAspect="1" noChangeArrowheads="1"/>
           </p:cNvPicPr>
@@ -22340,8 +22390,8 @@
         </p:blipFill>
         <p:spPr bwMode="auto">
           <a:xfrm>
-            <a:off x="323528" y="4581128"/>
-            <a:ext cx="8399122" cy="1584176"/>
+            <a:off x="323528" y="1628800"/>
+            <a:ext cx="7290810" cy="1728192"/>
           </a:xfrm>
           <a:prstGeom prst="rect">
             <a:avLst/>
@@ -22383,7 +22433,7 @@
       </p:pic>
       <p:pic>
         <p:nvPicPr>
-          <p:cNvPr id="10243" name="Picture 3"/>
+          <p:cNvPr id="1026" name="Picture 2"/>
           <p:cNvPicPr>
             <a:picLocks noChangeAspect="1" noChangeArrowheads="1"/>
           </p:cNvPicPr>
@@ -22408,8 +22458,8 @@
         </p:blipFill>
         <p:spPr bwMode="auto">
           <a:xfrm>
-            <a:off x="323528" y="1628800"/>
-            <a:ext cx="7290810" cy="1728192"/>
+            <a:off x="323528" y="4753119"/>
+            <a:ext cx="8689800" cy="1296144"/>
           </a:xfrm>
           <a:prstGeom prst="rect">
             <a:avLst/>
@@ -22579,7 +22629,7 @@
                                           </p:stCondLst>
                                         </p:cTn>
                                         <p:tgtEl>
-                                          <p:spTgt spid="10242"/>
+                                          <p:spTgt spid="1026"/>
                                         </p:tgtEl>
                                         <p:attrNameLst>
                                           <p:attrName>style.visibility</p:attrName>
@@ -22593,7 +22643,7 @@
                                       <p:cBhvr>
                                         <p:cTn id="14" dur="500"/>
                                         <p:tgtEl>
-                                          <p:spTgt spid="10242"/>
+                                          <p:spTgt spid="1026"/>
                                         </p:tgtEl>
                                       </p:cBhvr>
                                     </p:animEffect>
@@ -22610,7 +22660,7 @@
                                       <p:cBhvr>
                                         <p:cTn id="16" dur="2000" fill="hold"/>
                                         <p:tgtEl>
-                                          <p:spTgt spid="10242"/>
+                                          <p:spTgt spid="1026"/>
                                         </p:tgtEl>
                                         <p:attrNameLst>
                                           <p:attrName>ppt_x</p:attrName>
@@ -22843,7 +22893,7 @@
       </p:sp>
       <p:pic>
         <p:nvPicPr>
-          <p:cNvPr id="11266" name="Picture 2"/>
+          <p:cNvPr id="2050" name="Picture 2"/>
           <p:cNvPicPr>
             <a:picLocks noChangeAspect="1" noChangeArrowheads="1"/>
           </p:cNvPicPr>
@@ -22868,8 +22918,8 @@
         </p:blipFill>
         <p:spPr bwMode="auto">
           <a:xfrm>
-            <a:off x="323528" y="3068960"/>
-            <a:ext cx="7639524" cy="3240360"/>
+            <a:off x="323528" y="3140968"/>
+            <a:ext cx="8418216" cy="2882255"/>
           </a:xfrm>
           <a:prstGeom prst="rect">
             <a:avLst/>
@@ -22964,7 +23014,7 @@
                                           </p:stCondLst>
                                         </p:cTn>
                                         <p:tgtEl>
-                                          <p:spTgt spid="11266"/>
+                                          <p:spTgt spid="2050"/>
                                         </p:tgtEl>
                                         <p:attrNameLst>
                                           <p:attrName>style.visibility</p:attrName>
@@ -22978,7 +23028,7 @@
                                       <p:cBhvr>
                                         <p:cTn id="7" dur="500"/>
                                         <p:tgtEl>
-                                          <p:spTgt spid="11266"/>
+                                          <p:spTgt spid="2050"/>
                                         </p:tgtEl>
                                       </p:cBhvr>
                                     </p:animEffect>
@@ -22995,7 +23045,7 @@
                                       <p:cBhvr>
                                         <p:cTn id="9" dur="2000" fill="hold"/>
                                         <p:tgtEl>
-                                          <p:spTgt spid="11266"/>
+                                          <p:spTgt spid="2050"/>
                                         </p:tgtEl>
                                         <p:attrNameLst>
                                           <p:attrName>ppt_x</p:attrName>
@@ -23296,7 +23346,7 @@
       </p:pic>
       <p:pic>
         <p:nvPicPr>
-          <p:cNvPr id="12291" name="Picture 3"/>
+          <p:cNvPr id="3074" name="Picture 2"/>
           <p:cNvPicPr>
             <a:picLocks noChangeAspect="1" noChangeArrowheads="1"/>
           </p:cNvPicPr>
@@ -23321,8 +23371,8 @@
         </p:blipFill>
         <p:spPr bwMode="auto">
           <a:xfrm>
-            <a:off x="323528" y="1645746"/>
-            <a:ext cx="4608512" cy="4654482"/>
+            <a:off x="323528" y="1663358"/>
+            <a:ext cx="5688632" cy="4363685"/>
           </a:xfrm>
           <a:prstGeom prst="rect">
             <a:avLst/>
@@ -23558,7 +23608,7 @@
                                           </p:stCondLst>
                                         </p:cTn>
                                         <p:tgtEl>
-                                          <p:spTgt spid="12291"/>
+                                          <p:spTgt spid="3074"/>
                                         </p:tgtEl>
                                         <p:attrNameLst>
                                           <p:attrName>style.visibility</p:attrName>
@@ -23572,7 +23622,7 @@
                                       <p:cBhvr>
                                         <p:cTn id="20" dur="500"/>
                                         <p:tgtEl>
-                                          <p:spTgt spid="12291"/>
+                                          <p:spTgt spid="3074"/>
                                         </p:tgtEl>
                                       </p:cBhvr>
                                     </p:animEffect>
@@ -23589,7 +23639,7 @@
                                       <p:cBhvr>
                                         <p:cTn id="22" dur="2000" fill="hold"/>
                                         <p:tgtEl>
-                                          <p:spTgt spid="12291"/>
+                                          <p:spTgt spid="3074"/>
                                         </p:tgtEl>
                                         <p:attrNameLst>
                                           <p:attrName>ppt_x</p:attrName>
@@ -23885,7 +23935,7 @@
       </p:pic>
       <p:pic>
         <p:nvPicPr>
-          <p:cNvPr id="13315" name="Picture 3"/>
+          <p:cNvPr id="4098" name="Picture 2"/>
           <p:cNvPicPr>
             <a:picLocks noChangeAspect="1" noChangeArrowheads="1"/>
           </p:cNvPicPr>
@@ -23910,8 +23960,8 @@
         </p:blipFill>
         <p:spPr bwMode="auto">
           <a:xfrm>
-            <a:off x="312068" y="3068960"/>
-            <a:ext cx="8161631" cy="2312462"/>
+            <a:off x="323528" y="4509120"/>
+            <a:ext cx="8119643" cy="1735763"/>
           </a:xfrm>
           <a:prstGeom prst="rect">
             <a:avLst/>
@@ -24147,7 +24197,7 @@
                                           </p:stCondLst>
                                         </p:cTn>
                                         <p:tgtEl>
-                                          <p:spTgt spid="13315"/>
+                                          <p:spTgt spid="4098"/>
                                         </p:tgtEl>
                                         <p:attrNameLst>
                                           <p:attrName>style.visibility</p:attrName>
@@ -24161,7 +24211,7 @@
                                       <p:cBhvr>
                                         <p:cTn id="20" dur="500"/>
                                         <p:tgtEl>
-                                          <p:spTgt spid="13315"/>
+                                          <p:spTgt spid="4098"/>
                                         </p:tgtEl>
                                       </p:cBhvr>
                                     </p:animEffect>
@@ -24178,7 +24228,7 @@
                                       <p:cBhvr>
                                         <p:cTn id="22" dur="2000" fill="hold"/>
                                         <p:tgtEl>
-                                          <p:spTgt spid="13315"/>
+                                          <p:spTgt spid="4098"/>
                                         </p:tgtEl>
                                         <p:attrNameLst>
                                           <p:attrName>ppt_x</p:attrName>
@@ -24335,10 +24385,10 @@
           <a:lstStyle/>
           <a:p>
             <a:r>
-              <a:rPr lang="pl-PL" dirty="0" smtClean="0"/>
-              <a:t>First – use arrays</a:t>
+              <a:rPr lang="pl-PL" sz="2800" dirty="0" smtClean="0"/>
+              <a:t>Modify IndexMulti method</a:t>
             </a:r>
-            <a:endParaRPr lang="en-CA" dirty="0"/>
+            <a:endParaRPr lang="en-CA" sz="2800" dirty="0"/>
           </a:p>
         </p:txBody>
       </p:sp>
@@ -24360,7 +24410,11 @@
           <a:bodyPr/>
           <a:lstStyle/>
           <a:p>
-            <a:endParaRPr lang="en-CA"/>
+            <a:r>
+              <a:rPr lang="pl-PL" dirty="0" smtClean="0"/>
+              <a:t>Put only suitable elements</a:t>
+            </a:r>
+            <a:endParaRPr lang="en-CA" dirty="0"/>
           </a:p>
         </p:txBody>
       </p:sp>
@@ -24382,7 +24436,11 @@
           <a:bodyPr/>
           <a:lstStyle/>
           <a:p>
-            <a:endParaRPr lang="en-CA"/>
+            <a:r>
+              <a:rPr lang="pl-PL" dirty="0" smtClean="0"/>
+              <a:t>Print new collection</a:t>
+            </a:r>
+            <a:endParaRPr lang="en-CA" dirty="0"/>
           </a:p>
         </p:txBody>
       </p:sp>
@@ -24404,7 +24462,11 @@
           <a:bodyPr/>
           <a:lstStyle/>
           <a:p>
-            <a:endParaRPr lang="en-CA"/>
+            <a:r>
+              <a:rPr lang="pl-PL" dirty="0" smtClean="0"/>
+              <a:t>Create new collection</a:t>
+            </a:r>
+            <a:endParaRPr lang="en-CA" dirty="0"/>
           </a:p>
         </p:txBody>
       </p:sp>
@@ -24435,7 +24497,7 @@
         </p:blipFill>
         <p:spPr bwMode="auto">
           <a:xfrm>
-            <a:off x="323529" y="4521890"/>
+            <a:off x="251520" y="4648112"/>
             <a:ext cx="8640960" cy="1373176"/>
           </a:xfrm>
           <a:prstGeom prst="rect">
@@ -24478,7 +24540,7 @@
       </p:pic>
       <p:pic>
         <p:nvPicPr>
-          <p:cNvPr id="14340" name="Picture 4"/>
+          <p:cNvPr id="5122" name="Picture 2"/>
           <p:cNvPicPr>
             <a:picLocks noChangeAspect="1" noChangeArrowheads="1"/>
           </p:cNvPicPr>
@@ -24503,8 +24565,8 @@
         </p:blipFill>
         <p:spPr bwMode="auto">
           <a:xfrm>
-            <a:off x="323529" y="3140968"/>
-            <a:ext cx="7246672" cy="2952348"/>
+            <a:off x="251520" y="2348880"/>
+            <a:ext cx="8753613" cy="1942331"/>
           </a:xfrm>
           <a:prstGeom prst="rect">
             <a:avLst/>
@@ -24740,7 +24802,7 @@
                                           </p:stCondLst>
                                         </p:cTn>
                                         <p:tgtEl>
-                                          <p:spTgt spid="14340"/>
+                                          <p:spTgt spid="5122"/>
                                         </p:tgtEl>
                                         <p:attrNameLst>
                                           <p:attrName>style.visibility</p:attrName>
@@ -24754,7 +24816,7 @@
                                       <p:cBhvr>
                                         <p:cTn id="20" dur="500"/>
                                         <p:tgtEl>
-                                          <p:spTgt spid="14340"/>
+                                          <p:spTgt spid="5122"/>
                                         </p:tgtEl>
                                       </p:cBhvr>
                                     </p:animEffect>
@@ -24771,7 +24833,7 @@
                                       <p:cBhvr>
                                         <p:cTn id="22" dur="2000" fill="hold"/>
                                         <p:tgtEl>
-                                          <p:spTgt spid="14340"/>
+                                          <p:spTgt spid="5122"/>
                                         </p:tgtEl>
                                         <p:attrNameLst>
                                           <p:attrName>ppt_x</p:attrName>
@@ -27044,13 +27106,13 @@
 
 <file path=ppt/tags/tag280.xml><?xml version="1.0" encoding="utf-8"?>
 <p:tagLst xmlns:a="http://schemas.openxmlformats.org/drawingml/2006/main" xmlns:r="http://schemas.openxmlformats.org/officeDocument/2006/relationships" xmlns:p="http://schemas.openxmlformats.org/presentationml/2006/main">
-  <p:tag name="DVSHAPEID" val="WtYsRP1Iobw2AtKE5VWLSp"/>
+  <p:tag name="DVSHAPEID" val="auBhUhFg04RR5l831gjgN5"/>
 </p:tagLst>
 </file>
 
 <file path=ppt/tags/tag281.xml><?xml version="1.0" encoding="utf-8"?>
 <p:tagLst xmlns:a="http://schemas.openxmlformats.org/drawingml/2006/main" xmlns:r="http://schemas.openxmlformats.org/officeDocument/2006/relationships" xmlns:p="http://schemas.openxmlformats.org/presentationml/2006/main">
-  <p:tag name="DVSHAPEID" val="auBhUhFg04RR5l831gjgN5"/>
+  <p:tag name="DVSHAPEID" val="b1LwVEwaYQW4kJaPny9D1d"/>
 </p:tagLst>
 </file>
 
@@ -27110,7 +27172,7 @@
 
 <file path=ppt/tags/tag290.xml><?xml version="1.0" encoding="utf-8"?>
 <p:tagLst xmlns:a="http://schemas.openxmlformats.org/drawingml/2006/main" xmlns:r="http://schemas.openxmlformats.org/officeDocument/2006/relationships" xmlns:p="http://schemas.openxmlformats.org/presentationml/2006/main">
-  <p:tag name="DVSHAPEID" val="5CNONfbDYGqAsCpoqIDRiD"/>
+  <p:tag name="DVSHAPEID" val="H4GkvrH9ty4Go0LQIQiw9H"/>
 </p:tagLst>
 </file>
 
@@ -27182,7 +27244,7 @@
 
 <file path=ppt/tags/tag300.xml><?xml version="1.0" encoding="utf-8"?>
 <p:tagLst xmlns:a="http://schemas.openxmlformats.org/drawingml/2006/main" xmlns:r="http://schemas.openxmlformats.org/officeDocument/2006/relationships" xmlns:p="http://schemas.openxmlformats.org/presentationml/2006/main">
-  <p:tag name="DVSHAPEID" val="Z3XQJis2OhchNCmgN3i7Gv"/>
+  <p:tag name="DVSHAPEID" val="6OTfXl5rEzMYkHPA94tOmn"/>
 </p:tagLst>
 </file>
 
@@ -27248,7 +27310,7 @@
 
 <file path=ppt/tags/tag310.xml><?xml version="1.0" encoding="utf-8"?>
 <p:tagLst xmlns:a="http://schemas.openxmlformats.org/drawingml/2006/main" xmlns:r="http://schemas.openxmlformats.org/officeDocument/2006/relationships" xmlns:p="http://schemas.openxmlformats.org/presentationml/2006/main">
-  <p:tag name="DVSHAPEID" val="q8KoefNUlfuOuDphGrWRdJ"/>
+  <p:tag name="DVSHAPEID" val="TpF307He2klJNfUNhyBleg"/>
 </p:tagLst>
 </file>
 
@@ -27314,7 +27376,7 @@
 
 <file path=ppt/tags/tag320.xml><?xml version="1.0" encoding="utf-8"?>
 <p:tagLst xmlns:a="http://schemas.openxmlformats.org/drawingml/2006/main" xmlns:r="http://schemas.openxmlformats.org/officeDocument/2006/relationships" xmlns:p="http://schemas.openxmlformats.org/presentationml/2006/main">
-  <p:tag name="DVSHAPEID" val="IwKdaWrTIgw7fnpx34IOPV"/>
+  <p:tag name="DVSHAPEID" val="De4blH4vrxgCtkk3XNEVz1"/>
 </p:tagLst>
 </file>
 

</xml_diff>

<commit_message>
Added front-end dev desc from Kira
</commit_message>
<xml_diff>
--- a/Programming Made Easy.pptx
+++ b/Programming Made Easy.pptx
@@ -3099,15 +3099,7 @@
           <a:bodyPr/>
           <a:lstStyle/>
           <a:p>
-            <a:r>
-              <a:rPr lang="pl-PL" dirty="0" smtClean="0"/>
-              <a:t>An</a:t>
-            </a:r>
-            <a:r>
-              <a:rPr lang="pl-PL" baseline="0" dirty="0" smtClean="0"/>
-              <a:t> application for my wife for time tracking – there was no simple free time tracking app</a:t>
-            </a:r>
-            <a:endParaRPr lang="en-CA" dirty="0"/>
+            <a:endParaRPr lang="en-CA"/>
           </a:p>
         </p:txBody>
       </p:sp>
@@ -3128,7 +3120,7 @@
           <a:p>
             <a:fld id="{F036235D-DA40-4917-9347-5AA27D26558A}" type="slidenum">
               <a:rPr lang="en-CA" smtClean="0"/>
-              <a:t>6</a:t>
+              <a:t>3</a:t>
             </a:fld>
             <a:endParaRPr lang="en-CA"/>
           </a:p>
@@ -3137,7 +3129,7 @@
     </p:spTree>
     <p:extLst>
       <p:ext uri="{BB962C8B-B14F-4D97-AF65-F5344CB8AC3E}">
-        <p14:creationId xmlns:p14="http://schemas.microsoft.com/office/powerpoint/2010/main" val="1925869474"/>
+        <p14:creationId xmlns:p14="http://schemas.microsoft.com/office/powerpoint/2010/main" val="3759617061"/>
       </p:ext>
     </p:extLst>
   </p:cSld>
@@ -3193,37 +3185,11 @@
           <a:p>
             <a:r>
               <a:rPr lang="pl-PL" dirty="0" smtClean="0"/>
-              <a:t>Desktop apps are usually</a:t>
+              <a:t>An</a:t>
             </a:r>
             <a:r>
               <a:rPr lang="pl-PL" baseline="0" dirty="0" smtClean="0"/>
-              <a:t> specific for a particular platform (operating system). Sometimes they can be OS agnostic. Usually not so robust as native ones.</a:t>
-            </a:r>
-          </a:p>
-          <a:p>
-            <a:r>
-              <a:rPr lang="pl-PL" baseline="0" dirty="0" smtClean="0"/>
-              <a:t>Explain what native means.</a:t>
-            </a:r>
-          </a:p>
-          <a:p>
-            <a:r>
-              <a:rPr lang="pl-PL" baseline="0" dirty="0" smtClean="0"/>
-              <a:t>Web application – works on a server side, presented to a user by a browser. Usually OS and browser agnostic. Sometimes use technology that requires specific OS/browser. Example: Flash doesn’t work on iOS. Silverlight has no official and current implementation for Linux (works on Windows and Mac only)</a:t>
-            </a:r>
-          </a:p>
-          <a:p>
-            <a:r>
-              <a:rPr lang="pl-PL" dirty="0" smtClean="0"/>
-              <a:t>Embedded applications – robotic rovers, washing</a:t>
-            </a:r>
-            <a:r>
-              <a:rPr lang="pl-PL" baseline="0" dirty="0" smtClean="0"/>
-              <a:t> machines, </a:t>
-            </a:r>
-            <a:r>
-              <a:rPr lang="pl-PL" baseline="0" smtClean="0"/>
-              <a:t>home a</a:t>
+              <a:t> application for my wife for time tracking – there was no simple free time tracking app</a:t>
             </a:r>
             <a:endParaRPr lang="en-CA" dirty="0"/>
           </a:p>
@@ -3246,7 +3212,7 @@
           <a:p>
             <a:fld id="{F036235D-DA40-4917-9347-5AA27D26558A}" type="slidenum">
               <a:rPr lang="en-CA" smtClean="0"/>
-              <a:t>7</a:t>
+              <a:t>6</a:t>
             </a:fld>
             <a:endParaRPr lang="en-CA"/>
           </a:p>
@@ -3255,7 +3221,7 @@
     </p:spTree>
     <p:extLst>
       <p:ext uri="{BB962C8B-B14F-4D97-AF65-F5344CB8AC3E}">
-        <p14:creationId xmlns:p14="http://schemas.microsoft.com/office/powerpoint/2010/main" val="1697928017"/>
+        <p14:creationId xmlns:p14="http://schemas.microsoft.com/office/powerpoint/2010/main" val="1925869474"/>
       </p:ext>
     </p:extLst>
   </p:cSld>
@@ -3311,11 +3277,37 @@
           <a:p>
             <a:r>
               <a:rPr lang="pl-PL" dirty="0" smtClean="0"/>
-              <a:t>Often</a:t>
+              <a:t>Desktop apps are usually</a:t>
             </a:r>
             <a:r>
               <a:rPr lang="pl-PL" baseline="0" dirty="0" smtClean="0"/>
-              <a:t> used in the Web</a:t>
+              <a:t> specific for a particular platform (operating system). Sometimes they can be OS agnostic. Usually not so robust as native ones.</a:t>
+            </a:r>
+          </a:p>
+          <a:p>
+            <a:r>
+              <a:rPr lang="pl-PL" baseline="0" dirty="0" smtClean="0"/>
+              <a:t>Explain what native means.</a:t>
+            </a:r>
+          </a:p>
+          <a:p>
+            <a:r>
+              <a:rPr lang="pl-PL" baseline="0" dirty="0" smtClean="0"/>
+              <a:t>Web application – works on a server side, presented to a user by a browser. Usually OS and browser agnostic. Sometimes use technology that requires specific OS/browser. Example: Flash doesn’t work on iOS. Silverlight has no official and current implementation for Linux (works on Windows and Mac only)</a:t>
+            </a:r>
+          </a:p>
+          <a:p>
+            <a:r>
+              <a:rPr lang="pl-PL" dirty="0" smtClean="0"/>
+              <a:t>Embedded applications – robotic rovers, washing</a:t>
+            </a:r>
+            <a:r>
+              <a:rPr lang="pl-PL" baseline="0" dirty="0" smtClean="0"/>
+              <a:t> machines, </a:t>
+            </a:r>
+            <a:r>
+              <a:rPr lang="pl-PL" baseline="0" smtClean="0"/>
+              <a:t>home a</a:t>
             </a:r>
             <a:endParaRPr lang="en-CA" dirty="0"/>
           </a:p>
@@ -3338,7 +3330,7 @@
           <a:p>
             <a:fld id="{F036235D-DA40-4917-9347-5AA27D26558A}" type="slidenum">
               <a:rPr lang="en-CA" smtClean="0"/>
-              <a:t>13</a:t>
+              <a:t>7</a:t>
             </a:fld>
             <a:endParaRPr lang="en-CA"/>
           </a:p>
@@ -3347,7 +3339,7 @@
     </p:spTree>
     <p:extLst>
       <p:ext uri="{BB962C8B-B14F-4D97-AF65-F5344CB8AC3E}">
-        <p14:creationId xmlns:p14="http://schemas.microsoft.com/office/powerpoint/2010/main" val="2945381652"/>
+        <p14:creationId xmlns:p14="http://schemas.microsoft.com/office/powerpoint/2010/main" val="1697928017"/>
       </p:ext>
     </p:extLst>
   </p:cSld>
@@ -3403,11 +3395,11 @@
           <a:p>
             <a:r>
               <a:rPr lang="pl-PL" dirty="0" smtClean="0"/>
-              <a:t>Objects</a:t>
+              <a:t>Often</a:t>
             </a:r>
             <a:r>
               <a:rPr lang="pl-PL" baseline="0" dirty="0" smtClean="0"/>
-              <a:t> – encapsulate state and expose behaviour</a:t>
+              <a:t> used in the Web</a:t>
             </a:r>
             <a:endParaRPr lang="en-CA" dirty="0"/>
           </a:p>
@@ -3430,7 +3422,7 @@
           <a:p>
             <a:fld id="{F036235D-DA40-4917-9347-5AA27D26558A}" type="slidenum">
               <a:rPr lang="en-CA" smtClean="0"/>
-              <a:t>17</a:t>
+              <a:t>13</a:t>
             </a:fld>
             <a:endParaRPr lang="en-CA"/>
           </a:p>
@@ -3439,7 +3431,7 @@
     </p:spTree>
     <p:extLst>
       <p:ext uri="{BB962C8B-B14F-4D97-AF65-F5344CB8AC3E}">
-        <p14:creationId xmlns:p14="http://schemas.microsoft.com/office/powerpoint/2010/main" val="1103758951"/>
+        <p14:creationId xmlns:p14="http://schemas.microsoft.com/office/powerpoint/2010/main" val="2945381652"/>
       </p:ext>
     </p:extLst>
   </p:cSld>
@@ -3494,16 +3486,12 @@
           <a:lstStyle/>
           <a:p>
             <a:r>
-              <a:rPr lang="en-CA" sz="1200" b="1" i="0" kern="1200" dirty="0" err="1" smtClean="0">
-                <a:solidFill>
-                  <a:schemeClr val="tx1"/>
-                </a:solidFill>
-                <a:effectLst/>
-                <a:latin typeface="+mn-lt"/>
-                <a:ea typeface="+mn-ea"/>
-                <a:cs typeface="+mn-cs"/>
-              </a:rPr>
-              <a:t>webmusespresenter</a:t>
+              <a:rPr lang="pl-PL" dirty="0" smtClean="0"/>
+              <a:t>Objects</a:t>
+            </a:r>
+            <a:r>
+              <a:rPr lang="pl-PL" baseline="0" dirty="0" smtClean="0"/>
+              <a:t> – encapsulate state and expose behaviour</a:t>
             </a:r>
             <a:endParaRPr lang="en-CA" dirty="0"/>
           </a:p>
@@ -3526,7 +3514,7 @@
           <a:p>
             <a:fld id="{F036235D-DA40-4917-9347-5AA27D26558A}" type="slidenum">
               <a:rPr lang="en-CA" smtClean="0"/>
-              <a:t>20</a:t>
+              <a:t>17</a:t>
             </a:fld>
             <a:endParaRPr lang="en-CA"/>
           </a:p>
@@ -3535,7 +3523,7 @@
     </p:spTree>
     <p:extLst>
       <p:ext uri="{BB962C8B-B14F-4D97-AF65-F5344CB8AC3E}">
-        <p14:creationId xmlns:p14="http://schemas.microsoft.com/office/powerpoint/2010/main" val="1915565334"/>
+        <p14:creationId xmlns:p14="http://schemas.microsoft.com/office/powerpoint/2010/main" val="1103758951"/>
       </p:ext>
     </p:extLst>
   </p:cSld>
@@ -3590,14 +3578,16 @@
           <a:lstStyle/>
           <a:p>
             <a:r>
-              <a:rPr lang="pl-PL" dirty="0" smtClean="0"/>
-              <a:t>15 no wifi</a:t>
-            </a:r>
-          </a:p>
-          <a:p>
-            <a:r>
-              <a:rPr lang="pl-PL" dirty="0" smtClean="0"/>
-              <a:t>16 wifi</a:t>
+              <a:rPr lang="en-CA" sz="1200" b="1" i="0" kern="1200" dirty="0" err="1" smtClean="0">
+                <a:solidFill>
+                  <a:schemeClr val="tx1"/>
+                </a:solidFill>
+                <a:effectLst/>
+                <a:latin typeface="+mn-lt"/>
+                <a:ea typeface="+mn-ea"/>
+                <a:cs typeface="+mn-cs"/>
+              </a:rPr>
+              <a:t>webmusespresenter</a:t>
             </a:r>
             <a:endParaRPr lang="en-CA" dirty="0"/>
           </a:p>
@@ -3620,7 +3610,7 @@
           <a:p>
             <a:fld id="{F036235D-DA40-4917-9347-5AA27D26558A}" type="slidenum">
               <a:rPr lang="en-CA" smtClean="0"/>
-              <a:t>29</a:t>
+              <a:t>20</a:t>
             </a:fld>
             <a:endParaRPr lang="en-CA"/>
           </a:p>
@@ -3629,7 +3619,7 @@
     </p:spTree>
     <p:extLst>
       <p:ext uri="{BB962C8B-B14F-4D97-AF65-F5344CB8AC3E}">
-        <p14:creationId xmlns:p14="http://schemas.microsoft.com/office/powerpoint/2010/main" val="2681861613"/>
+        <p14:creationId xmlns:p14="http://schemas.microsoft.com/office/powerpoint/2010/main" val="1915565334"/>
       </p:ext>
     </p:extLst>
   </p:cSld>
@@ -3685,6 +3675,100 @@
           <a:p>
             <a:r>
               <a:rPr lang="pl-PL" dirty="0" smtClean="0"/>
+              <a:t>15 no wifi</a:t>
+            </a:r>
+          </a:p>
+          <a:p>
+            <a:r>
+              <a:rPr lang="pl-PL" dirty="0" smtClean="0"/>
+              <a:t>16 wifi</a:t>
+            </a:r>
+            <a:endParaRPr lang="en-CA" dirty="0"/>
+          </a:p>
+        </p:txBody>
+      </p:sp>
+      <p:sp>
+        <p:nvSpPr>
+          <p:cNvPr id="4" name="Slide Number Placeholder 3"/>
+          <p:cNvSpPr>
+            <a:spLocks noGrp="1"/>
+          </p:cNvSpPr>
+          <p:nvPr>
+            <p:ph type="sldNum" sz="quarter" idx="10"/>
+          </p:nvPr>
+        </p:nvSpPr>
+        <p:spPr/>
+        <p:txBody>
+          <a:bodyPr/>
+          <a:lstStyle/>
+          <a:p>
+            <a:fld id="{F036235D-DA40-4917-9347-5AA27D26558A}" type="slidenum">
+              <a:rPr lang="en-CA" smtClean="0"/>
+              <a:t>29</a:t>
+            </a:fld>
+            <a:endParaRPr lang="en-CA"/>
+          </a:p>
+        </p:txBody>
+      </p:sp>
+    </p:spTree>
+    <p:extLst>
+      <p:ext uri="{BB962C8B-B14F-4D97-AF65-F5344CB8AC3E}">
+        <p14:creationId xmlns:p14="http://schemas.microsoft.com/office/powerpoint/2010/main" val="2681861613"/>
+      </p:ext>
+    </p:extLst>
+  </p:cSld>
+  <p:clrMapOvr>
+    <a:masterClrMapping/>
+  </p:clrMapOvr>
+</p:notes>
+</file>
+
+<file path=ppt/notesSlides/notesSlide8.xml><?xml version="1.0" encoding="utf-8"?>
+<p:notes xmlns:a="http://schemas.openxmlformats.org/drawingml/2006/main" xmlns:r="http://schemas.openxmlformats.org/officeDocument/2006/relationships" xmlns:p="http://schemas.openxmlformats.org/presentationml/2006/main">
+  <p:cSld>
+    <p:spTree>
+      <p:nvGrpSpPr>
+        <p:cNvPr id="1" name=""/>
+        <p:cNvGrpSpPr/>
+        <p:nvPr/>
+      </p:nvGrpSpPr>
+      <p:grpSpPr>
+        <a:xfrm>
+          <a:off x="0" y="0"/>
+          <a:ext cx="0" cy="0"/>
+          <a:chOff x="0" y="0"/>
+          <a:chExt cx="0" cy="0"/>
+        </a:xfrm>
+      </p:grpSpPr>
+      <p:sp>
+        <p:nvSpPr>
+          <p:cNvPr id="2" name="Slide Image Placeholder 1"/>
+          <p:cNvSpPr>
+            <a:spLocks noGrp="1" noRot="1" noChangeAspect="1"/>
+          </p:cNvSpPr>
+          <p:nvPr>
+            <p:ph type="sldImg"/>
+          </p:nvPr>
+        </p:nvSpPr>
+        <p:spPr/>
+      </p:sp>
+      <p:sp>
+        <p:nvSpPr>
+          <p:cNvPr id="3" name="Notes Placeholder 2"/>
+          <p:cNvSpPr>
+            <a:spLocks noGrp="1"/>
+          </p:cNvSpPr>
+          <p:nvPr>
+            <p:ph type="body" idx="1"/>
+          </p:nvPr>
+        </p:nvSpPr>
+        <p:spPr/>
+        <p:txBody>
+          <a:bodyPr/>
+          <a:lstStyle/>
+          <a:p>
+            <a:r>
+              <a:rPr lang="pl-PL" dirty="0" smtClean="0"/>
               <a:t>#10 big</a:t>
             </a:r>
             <a:r>
@@ -3737,7 +3821,7 @@
 </p:notes>
 </file>
 
-<file path=ppt/notesSlides/notesSlide8.xml><?xml version="1.0" encoding="utf-8"?>
+<file path=ppt/notesSlides/notesSlide9.xml><?xml version="1.0" encoding="utf-8"?>
 <p:notes xmlns:a="http://schemas.openxmlformats.org/drawingml/2006/main" xmlns:r="http://schemas.openxmlformats.org/officeDocument/2006/relationships" xmlns:p="http://schemas.openxmlformats.org/presentationml/2006/main">
   <p:cSld>
     <p:spTree>
@@ -19133,10 +19217,20 @@
           <a:lstStyle/>
           <a:p>
             <a:r>
-              <a:rPr lang="pl-PL" sz="2800" dirty="0"/>
-              <a:t>Front-end developer (HTML/CSS)</a:t>
+              <a:rPr lang="pl-PL" sz="2400" dirty="0"/>
+              <a:t>Front-end developer (</a:t>
             </a:r>
-            <a:endParaRPr lang="en-CA" sz="2800" dirty="0"/>
+            <a:r>
+              <a:rPr lang="pl-PL" sz="2400" dirty="0" smtClean="0"/>
+              <a:t>HTML/CSS)</a:t>
+            </a:r>
+            <a:endParaRPr lang="pl-PL" sz="2400" dirty="0"/>
+          </a:p>
+          <a:p>
+            <a:r>
+              <a:rPr lang="pl-PL" sz="2400" dirty="0" smtClean="0"/>
+              <a:t>+XAML +jQuery</a:t>
+            </a:r>
           </a:p>
         </p:txBody>
       </p:sp>
@@ -19179,12 +19273,8 @@
           <a:lstStyle/>
           <a:p>
             <a:r>
-              <a:rPr lang="pl-PL" smtClean="0"/>
-              <a:t>infusion.com</a:t>
-            </a:r>
-            <a:r>
               <a:rPr lang="pl-PL" dirty="0" smtClean="0"/>
-              <a:t>/</a:t>
+              <a:t>infusion.com/</a:t>
             </a:r>
           </a:p>
           <a:p>

</xml_diff>